<commit_message>
Finishing touches and trained final mode, 85% test set accuracy
</commit_message>
<xml_diff>
--- a/CNN for Movie Review Sentiment Analysis.pptx
+++ b/CNN for Movie Review Sentiment Analysis.pptx
@@ -305,7 +305,7 @@
           <a:p>
             <a:fld id="{88D38747-4367-4BD2-8D51-C97E202738E2}" type="datetime1">
               <a:rPr lang="en-US" smtClean="0"/>
-              <a:t>2/10/2020</a:t>
+              <a:t>2/11/2020</a:t>
             </a:fld>
             <a:endParaRPr lang="en-US" dirty="0"/>
           </a:p>
@@ -610,7 +610,7 @@
           <a:p>
             <a:fld id="{11F1B079-7EF0-44EE-B798-BCC497C9F3B2}" type="datetime1">
               <a:rPr lang="en-US" smtClean="0"/>
-              <a:t>2/10/2020</a:t>
+              <a:t>2/11/2020</a:t>
             </a:fld>
             <a:endParaRPr lang="en-US" dirty="0"/>
           </a:p>
@@ -804,7 +804,7 @@
           <a:p>
             <a:fld id="{28FF70A8-1D13-4657-95F0-A9EA54967B8D}" type="datetime1">
               <a:rPr lang="en-US" smtClean="0"/>
-              <a:t>2/10/2020</a:t>
+              <a:t>2/11/2020</a:t>
             </a:fld>
             <a:endParaRPr lang="en-US" dirty="0"/>
           </a:p>
@@ -1067,7 +1067,7 @@
           <a:p>
             <a:fld id="{21EB90AC-71BD-4C7F-8ACA-7B3F18292E63}" type="datetime1">
               <a:rPr lang="en-US" smtClean="0"/>
-              <a:t>2/10/2020</a:t>
+              <a:t>2/11/2020</a:t>
             </a:fld>
             <a:endParaRPr lang="en-US" dirty="0"/>
           </a:p>
@@ -1503,7 +1503,7 @@
           <a:p>
             <a:fld id="{4E6EFC2C-8905-46F0-B443-CE905B76BA01}" type="datetime1">
               <a:rPr lang="en-US" smtClean="0"/>
-              <a:t>2/10/2020</a:t>
+              <a:t>2/11/2020</a:t>
             </a:fld>
             <a:endParaRPr lang="en-US" dirty="0"/>
           </a:p>
@@ -2040,7 +2040,7 @@
           <a:p>
             <a:fld id="{D9079DC3-C9B5-499E-9140-0DC28B7074E2}" type="datetime1">
               <a:rPr lang="en-US" smtClean="0"/>
-              <a:t>2/10/2020</a:t>
+              <a:t>2/11/2020</a:t>
             </a:fld>
             <a:endParaRPr lang="en-US" dirty="0"/>
           </a:p>
@@ -2922,7 +2922,7 @@
           <a:p>
             <a:fld id="{30BB33EA-E472-4D22-9C03-A9C14AA21CED}" type="datetime1">
               <a:rPr lang="en-US" smtClean="0"/>
-              <a:t>2/10/2020</a:t>
+              <a:t>2/11/2020</a:t>
             </a:fld>
             <a:endParaRPr lang="en-US" dirty="0"/>
           </a:p>
@@ -3092,7 +3092,7 @@
           <a:p>
             <a:fld id="{217E833E-1B6D-415F-AD29-75AE8C43BD0D}" type="datetime1">
               <a:rPr lang="en-US" smtClean="0"/>
-              <a:t>2/10/2020</a:t>
+              <a:t>2/11/2020</a:t>
             </a:fld>
             <a:endParaRPr lang="en-US" dirty="0"/>
           </a:p>
@@ -3276,7 +3276,7 @@
           <a:p>
             <a:fld id="{8452596F-08A7-4B70-989A-F2B1CF31E66B}" type="datetime1">
               <a:rPr lang="en-US" smtClean="0"/>
-              <a:t>2/10/2020</a:t>
+              <a:t>2/11/2020</a:t>
             </a:fld>
             <a:endParaRPr lang="en-US" dirty="0"/>
           </a:p>
@@ -3446,7 +3446,7 @@
           <a:p>
             <a:fld id="{73C55A3C-5767-4844-A0A3-83778C2E5409}" type="datetime1">
               <a:rPr lang="en-US" smtClean="0"/>
-              <a:t>2/10/2020</a:t>
+              <a:t>2/11/2020</a:t>
             </a:fld>
             <a:endParaRPr lang="en-US" dirty="0"/>
           </a:p>
@@ -3690,7 +3690,7 @@
           <a:p>
             <a:fld id="{CAE507A8-A5CF-4D38-AB86-7EDDA87A85D4}" type="datetime1">
               <a:rPr lang="en-US" smtClean="0"/>
-              <a:t>2/10/2020</a:t>
+              <a:t>2/11/2020</a:t>
             </a:fld>
             <a:endParaRPr lang="en-US" dirty="0"/>
           </a:p>
@@ -3932,7 +3932,7 @@
           <a:p>
             <a:fld id="{BDFCD27C-8599-43EF-BA1D-14DDC1946E06}" type="datetime1">
               <a:rPr lang="en-US" smtClean="0"/>
-              <a:t>2/10/2020</a:t>
+              <a:t>2/11/2020</a:t>
             </a:fld>
             <a:endParaRPr lang="en-US" dirty="0"/>
           </a:p>
@@ -4413,7 +4413,7 @@
           <a:p>
             <a:fld id="{49343D99-809A-49C0-96E5-4250D0B498EE}" type="datetime1">
               <a:rPr lang="en-US" smtClean="0"/>
-              <a:t>2/10/2020</a:t>
+              <a:t>2/11/2020</a:t>
             </a:fld>
             <a:endParaRPr lang="en-US" dirty="0"/>
           </a:p>
@@ -4531,7 +4531,7 @@
           <a:p>
             <a:fld id="{A143DE9B-B678-4EFB-BB7D-A4370204A0B0}" type="datetime1">
               <a:rPr lang="en-US" smtClean="0"/>
-              <a:t>2/10/2020</a:t>
+              <a:t>2/11/2020</a:t>
             </a:fld>
             <a:endParaRPr lang="en-US" dirty="0"/>
           </a:p>
@@ -4626,7 +4626,7 @@
           <a:p>
             <a:fld id="{E68812DA-F765-4142-A6A3-A8ED7235E082}" type="datetime1">
               <a:rPr lang="en-US" smtClean="0"/>
-              <a:t>2/10/2020</a:t>
+              <a:t>2/11/2020</a:t>
             </a:fld>
             <a:endParaRPr lang="en-US" dirty="0"/>
           </a:p>
@@ -4881,7 +4881,7 @@
           <a:p>
             <a:fld id="{3E0277FD-7DE6-41D4-930D-AC99F5AFE54E}" type="datetime1">
               <a:rPr lang="en-US" smtClean="0"/>
-              <a:t>2/10/2020</a:t>
+              <a:t>2/11/2020</a:t>
             </a:fld>
             <a:endParaRPr lang="en-US" dirty="0"/>
           </a:p>
@@ -5188,7 +5188,7 @@
           <a:p>
             <a:fld id="{9EA15526-7079-4B7B-987C-1B5FAE11A0FF}" type="datetime1">
               <a:rPr lang="en-US" smtClean="0"/>
-              <a:t>2/10/2020</a:t>
+              <a:t>2/11/2020</a:t>
             </a:fld>
             <a:endParaRPr lang="en-US" dirty="0"/>
           </a:p>
@@ -5423,7 +5423,7 @@
           <a:p>
             <a:fld id="{073ED0CC-082F-4160-86E5-0D6041F12778}" type="datetime1">
               <a:rPr lang="en-US" smtClean="0"/>
-              <a:t>2/10/2020</a:t>
+              <a:t>2/11/2020</a:t>
             </a:fld>
             <a:endParaRPr lang="en-US" dirty="0"/>
           </a:p>
@@ -6135,7 +6135,7 @@
         </p:blipFill>
         <p:spPr>
           <a:xfrm>
-            <a:off x="20" y="10"/>
+            <a:off x="20" y="-171440"/>
             <a:ext cx="12191980" cy="6857990"/>
           </a:xfrm>
           <a:prstGeom prst="rect">
@@ -6172,7 +6172,9 @@
           <a:lstStyle/>
           <a:p>
             <a:r>
-              <a:rPr lang="en-US" sz="4000"/>
+              <a:rPr lang="en-US" sz="4000" dirty="0">
+                <a:latin typeface="+mn-lt"/>
+              </a:rPr>
               <a:t>CNN for Movie Review Sentiment Analysis</a:t>
             </a:r>
           </a:p>
@@ -6202,7 +6204,7 @@
         </p:spPr>
         <p:txBody>
           <a:bodyPr vert="horz" lIns="91440" tIns="45720" rIns="91440" bIns="45720" rtlCol="0" anchor="ctr">
-            <a:normAutofit fontScale="77500" lnSpcReduction="20000"/>
+            <a:noAutofit/>
           </a:bodyPr>
           <a:lstStyle/>
           <a:p>
@@ -6212,7 +6214,7 @@
               </a:lnSpc>
             </a:pPr>
             <a:r>
-              <a:rPr lang="en-US" dirty="0">
+              <a:rPr lang="en-US" sz="2400" dirty="0">
                 <a:solidFill>
                   <a:schemeClr val="tx2"/>
                 </a:solidFill>
@@ -6225,11 +6227,11 @@
               <a:lnSpc>
                 <a:spcPct val="100000"/>
               </a:lnSpc>
-              <a:buFont typeface="Wingdings 2" charset="2"/>
+              <a:buFont typeface="Courier New" panose="02070309020205020404" pitchFamily="49" charset="0"/>
               <a:buChar char="o"/>
             </a:pPr>
             <a:r>
-              <a:rPr lang="en-US" sz="3300" dirty="0">
+              <a:rPr lang="en-US" sz="2400" dirty="0">
                 <a:solidFill>
                   <a:schemeClr val="tx2"/>
                 </a:solidFill>
@@ -6242,16 +6244,16 @@
               <a:lnSpc>
                 <a:spcPct val="100000"/>
               </a:lnSpc>
-              <a:buFont typeface="Wingdings 2" charset="2"/>
+              <a:buFont typeface="Courier New" panose="02070309020205020404" pitchFamily="49" charset="0"/>
               <a:buChar char="o"/>
             </a:pPr>
             <a:r>
-              <a:rPr lang="en-US" sz="3300" dirty="0">
+              <a:rPr lang="en-US" sz="2400" dirty="0">
                 <a:solidFill>
                   <a:schemeClr val="tx2"/>
                 </a:solidFill>
               </a:rPr>
-              <a:t>What are the different models available for sentiment analysis</a:t>
+              <a:t>Different models for sentiment analysis</a:t>
             </a:r>
           </a:p>
           <a:p>
@@ -6259,16 +6261,16 @@
               <a:lnSpc>
                 <a:spcPct val="100000"/>
               </a:lnSpc>
-              <a:buFont typeface="Wingdings 2" charset="2"/>
+              <a:buFont typeface="Courier New" panose="02070309020205020404" pitchFamily="49" charset="0"/>
               <a:buChar char="o"/>
             </a:pPr>
             <a:r>
-              <a:rPr lang="en-US" sz="3300" dirty="0">
+              <a:rPr lang="en-US" sz="2400" dirty="0">
                 <a:solidFill>
                   <a:schemeClr val="tx2"/>
                 </a:solidFill>
               </a:rPr>
-              <a:t>What is Convolutional Neural Network (CNN)</a:t>
+              <a:t>What is a Convolutional Neural Network (CNN)</a:t>
             </a:r>
           </a:p>
           <a:p>
@@ -6276,11 +6278,11 @@
               <a:lnSpc>
                 <a:spcPct val="100000"/>
               </a:lnSpc>
-              <a:buFont typeface="Wingdings 2" charset="2"/>
+              <a:buFont typeface="Courier New" panose="02070309020205020404" pitchFamily="49" charset="0"/>
               <a:buChar char="o"/>
             </a:pPr>
             <a:r>
-              <a:rPr lang="en-US" sz="3300" dirty="0">
+              <a:rPr lang="en-US" sz="2400" dirty="0">
                 <a:solidFill>
                   <a:schemeClr val="tx2"/>
                 </a:solidFill>
@@ -6293,16 +6295,16 @@
               <a:lnSpc>
                 <a:spcPct val="100000"/>
               </a:lnSpc>
-              <a:buFont typeface="Wingdings 2" charset="2"/>
+              <a:buFont typeface="Courier New" panose="02070309020205020404" pitchFamily="49" charset="0"/>
               <a:buChar char="o"/>
             </a:pPr>
             <a:r>
-              <a:rPr lang="en-US" sz="3300" dirty="0">
+              <a:rPr lang="en-US" sz="2400" dirty="0">
                 <a:solidFill>
                   <a:schemeClr val="tx2"/>
                 </a:solidFill>
               </a:rPr>
-              <a:t>Word Embeddings </a:t>
+              <a:t>Word Embeddings</a:t>
             </a:r>
           </a:p>
           <a:p>
@@ -6310,16 +6312,16 @@
               <a:lnSpc>
                 <a:spcPct val="100000"/>
               </a:lnSpc>
-              <a:buFont typeface="Wingdings 2" charset="2"/>
+              <a:buFont typeface="Courier New" panose="02070309020205020404" pitchFamily="49" charset="0"/>
               <a:buChar char="o"/>
             </a:pPr>
             <a:r>
-              <a:rPr lang="en-US" sz="3300" dirty="0">
+              <a:rPr lang="en-US" sz="2400" dirty="0">
                 <a:solidFill>
                   <a:schemeClr val="tx2"/>
                 </a:solidFill>
               </a:rPr>
-              <a:t>The Final Model and Results </a:t>
+              <a:t>The Final Model</a:t>
             </a:r>
           </a:p>
           <a:p>
@@ -6327,45 +6329,17 @@
               <a:lnSpc>
                 <a:spcPct val="100000"/>
               </a:lnSpc>
-              <a:buFont typeface="Wingdings 2" charset="2"/>
+              <a:buFont typeface="Courier New" panose="02070309020205020404" pitchFamily="49" charset="0"/>
               <a:buChar char="o"/>
             </a:pPr>
             <a:r>
-              <a:rPr lang="en-US" sz="3300" dirty="0">
+              <a:rPr lang="en-US" sz="2400" dirty="0">
                 <a:solidFill>
                   <a:schemeClr val="tx2"/>
                 </a:solidFill>
               </a:rPr>
               <a:t>Improvements</a:t>
             </a:r>
-          </a:p>
-          <a:p>
-            <a:pPr marL="342900" indent="-342900" algn="l">
-              <a:lnSpc>
-                <a:spcPct val="100000"/>
-              </a:lnSpc>
-              <a:buFont typeface="Wingdings 2" charset="2"/>
-              <a:buChar char="o"/>
-            </a:pPr>
-            <a:endParaRPr lang="en-US" dirty="0">
-              <a:solidFill>
-                <a:schemeClr val="tx2"/>
-              </a:solidFill>
-            </a:endParaRPr>
-          </a:p>
-          <a:p>
-            <a:pPr marL="342900" indent="-342900" algn="l">
-              <a:lnSpc>
-                <a:spcPct val="100000"/>
-              </a:lnSpc>
-              <a:buFont typeface="Wingdings 2" charset="2"/>
-              <a:buChar char="o"/>
-            </a:pPr>
-            <a:endParaRPr lang="en-US" dirty="0">
-              <a:solidFill>
-                <a:schemeClr val="tx2"/>
-              </a:solidFill>
-            </a:endParaRPr>
           </a:p>
         </p:txBody>
       </p:sp>
@@ -6417,11 +6391,15 @@
         </p:nvSpPr>
         <p:spPr/>
         <p:txBody>
-          <a:bodyPr/>
+          <a:bodyPr>
+            <a:normAutofit/>
+          </a:bodyPr>
           <a:lstStyle/>
           <a:p>
             <a:r>
-              <a:rPr lang="en-GB" dirty="0"/>
+              <a:rPr lang="en-GB" sz="4000" dirty="0">
+                <a:latin typeface="+mn-lt"/>
+              </a:rPr>
               <a:t>The Power of NLP</a:t>
             </a:r>
           </a:p>
@@ -6456,44 +6434,38 @@
           <a:lstStyle/>
           <a:p>
             <a:r>
-              <a:rPr lang="en-GB" dirty="0"/>
+              <a:rPr lang="en-GB" sz="2400" dirty="0"/>
               <a:t>NLP is a large field including Machine Translation, Q&amp;A, Sentiment Analysis, Speech Recognition and much more</a:t>
             </a:r>
           </a:p>
           <a:p>
             <a:r>
-              <a:rPr lang="en-GB" dirty="0"/>
+              <a:rPr lang="en-GB" sz="2400" dirty="0"/>
               <a:t>Value of NLP data held by companies is £1.3T [IDC 2014]</a:t>
             </a:r>
           </a:p>
           <a:p>
             <a:r>
-              <a:rPr lang="en-GB" dirty="0"/>
+              <a:rPr lang="en-GB" sz="2400" dirty="0"/>
               <a:t>8.4PB of data produced per second [business2community 2016]</a:t>
             </a:r>
           </a:p>
           <a:p>
             <a:r>
-              <a:rPr lang="en-GB" dirty="0"/>
+              <a:rPr lang="en-GB" sz="2400" dirty="0"/>
               <a:t>Only 10% of organizations commercialise their data [Gartner 2016]</a:t>
             </a:r>
           </a:p>
           <a:p>
             <a:r>
-              <a:rPr lang="en-GB" dirty="0"/>
+              <a:rPr lang="en-GB" sz="2400" dirty="0"/>
               <a:t>70% of companies have customer feedback data [business2community 2016]</a:t>
             </a:r>
           </a:p>
           <a:p>
             <a:r>
-              <a:rPr lang="en-GB" dirty="0"/>
-              <a:t>There is an awful lot of text-based data which can be mined or analysed to increase profits</a:t>
-            </a:r>
-          </a:p>
-          <a:p>
-            <a:r>
-              <a:rPr lang="en-GB" dirty="0"/>
-              <a:t>For example Q&amp;A bots with customer database integration means no more call centres or waiting for long periods of time for the customer.  Kyle.ai provides Q&amp;A bots to big clients such as Microsoft, Airbnb, LinkedIn, Airlines</a:t>
+              <a:rPr lang="en-GB" sz="2400" dirty="0"/>
+              <a:t>Q&amp;A bots with customer database integration means no more call centres or waiting for long periods of time for the customer.  Kylie.ai provides Q&amp;A bots to big clients such as Microsoft, Airbnb, LinkedIn, Airlines</a:t>
             </a:r>
           </a:p>
           <a:p>
@@ -6885,67 +6857,6 @@
                       </p:childTnLst>
                     </p:cTn>
                   </p:par>
-                  <p:par>
-                    <p:cTn id="33" fill="hold">
-                      <p:stCondLst>
-                        <p:cond delay="indefinite"/>
-                      </p:stCondLst>
-                      <p:childTnLst>
-                        <p:par>
-                          <p:cTn id="34" fill="hold">
-                            <p:stCondLst>
-                              <p:cond delay="0"/>
-                            </p:stCondLst>
-                            <p:childTnLst>
-                              <p:par>
-                                <p:cTn id="35" presetID="10" presetClass="entr" presetSubtype="0" fill="hold" nodeType="clickEffect">
-                                  <p:stCondLst>
-                                    <p:cond delay="0"/>
-                                  </p:stCondLst>
-                                  <p:childTnLst>
-                                    <p:set>
-                                      <p:cBhvr>
-                                        <p:cTn id="36" dur="1" fill="hold">
-                                          <p:stCondLst>
-                                            <p:cond delay="0"/>
-                                          </p:stCondLst>
-                                        </p:cTn>
-                                        <p:tgtEl>
-                                          <p:spTgt spid="3">
-                                            <p:txEl>
-                                              <p:pRg st="6" end="6"/>
-                                            </p:txEl>
-                                          </p:spTgt>
-                                        </p:tgtEl>
-                                        <p:attrNameLst>
-                                          <p:attrName>style.visibility</p:attrName>
-                                        </p:attrNameLst>
-                                      </p:cBhvr>
-                                      <p:to>
-                                        <p:strVal val="visible"/>
-                                      </p:to>
-                                    </p:set>
-                                    <p:animEffect transition="in" filter="fade">
-                                      <p:cBhvr>
-                                        <p:cTn id="37" dur="500"/>
-                                        <p:tgtEl>
-                                          <p:spTgt spid="3">
-                                            <p:txEl>
-                                              <p:pRg st="6" end="6"/>
-                                            </p:txEl>
-                                          </p:spTgt>
-                                        </p:tgtEl>
-                                      </p:cBhvr>
-                                    </p:animEffect>
-                                  </p:childTnLst>
-                                </p:cTn>
-                              </p:par>
-                            </p:childTnLst>
-                          </p:cTn>
-                        </p:par>
-                      </p:childTnLst>
-                    </p:cTn>
-                  </p:par>
                 </p:childTnLst>
               </p:cTn>
               <p:prevCondLst>
@@ -7011,7 +6922,17 @@
           <a:p>
             <a:r>
               <a:rPr lang="en-GB" dirty="0"/>
-              <a:t>Different Models for Sentiment Analysis</a:t>
+              <a:t>Different </a:t>
+            </a:r>
+            <a:r>
+              <a:rPr lang="en-GB" sz="4000" dirty="0">
+                <a:latin typeface="+mn-lt"/>
+              </a:rPr>
+              <a:t>Models</a:t>
+            </a:r>
+            <a:r>
+              <a:rPr lang="en-GB" dirty="0"/>
+              <a:t> for Sentiment Analysis</a:t>
             </a:r>
           </a:p>
         </p:txBody>
@@ -7034,24 +6955,24 @@
         </p:nvSpPr>
         <p:spPr>
           <a:xfrm>
-            <a:off x="913795" y="1866900"/>
-            <a:ext cx="10353762" cy="1352550"/>
+            <a:off x="913795" y="1866899"/>
+            <a:ext cx="10353762" cy="1826420"/>
           </a:xfrm>
         </p:spPr>
         <p:txBody>
           <a:bodyPr>
-            <a:normAutofit lnSpcReduction="10000"/>
+            <a:normAutofit fontScale="92500" lnSpcReduction="10000"/>
           </a:bodyPr>
           <a:lstStyle/>
           <a:p>
             <a:r>
-              <a:rPr lang="en-GB" dirty="0"/>
+              <a:rPr lang="en-GB" sz="2600" dirty="0"/>
               <a:t>NLP models are not straightforward since machine learning models need vectors of numbers as input not sentences </a:t>
             </a:r>
           </a:p>
           <a:p>
             <a:r>
-              <a:rPr lang="en-GB" dirty="0"/>
+              <a:rPr lang="en-GB" sz="2600" dirty="0"/>
               <a:t>The words in a sentence can be viewed as sequence data. Can use a Many-to-One LSTM</a:t>
             </a:r>
           </a:p>
@@ -7092,8 +7013,8 @@
         </p:blipFill>
         <p:spPr bwMode="auto">
           <a:xfrm>
-            <a:off x="3577337" y="3124200"/>
-            <a:ext cx="5037326" cy="2176912"/>
+            <a:off x="3940476" y="3638690"/>
+            <a:ext cx="4300399" cy="1858444"/>
           </a:xfrm>
           <a:prstGeom prst="rect">
             <a:avLst/>
@@ -7518,8 +7439,796 @@
         </p:nvSpPr>
         <p:spPr>
           <a:xfrm>
-            <a:off x="913795" y="5465109"/>
-            <a:ext cx="10353762" cy="1352550"/>
+            <a:off x="913795" y="5641391"/>
+            <a:ext cx="10353762" cy="999985"/>
+          </a:xfrm>
+          <a:prstGeom prst="rect">
+            <a:avLst/>
+          </a:prstGeom>
+          <a:effectLst>
+            <a:outerShdw blurRad="25400" dir="17880000">
+              <a:srgbClr val="000000">
+                <a:alpha val="46000"/>
+              </a:srgbClr>
+            </a:outerShdw>
+          </a:effectLst>
+        </p:spPr>
+        <p:txBody>
+          <a:bodyPr vert="horz" lIns="91440" tIns="45720" rIns="91440" bIns="45720" rtlCol="0" anchor="t">
+            <a:noAutofit/>
+          </a:bodyPr>
+          <a:lstStyle>
+            <a:lvl1pPr marL="342900" indent="-306000" algn="l" defTabSz="457200" rtl="0" eaLnBrk="1" latinLnBrk="0" hangingPunct="1">
+              <a:lnSpc>
+                <a:spcPct val="110000"/>
+              </a:lnSpc>
+              <a:spcBef>
+                <a:spcPct val="20000"/>
+              </a:spcBef>
+              <a:spcAft>
+                <a:spcPts val="600"/>
+              </a:spcAft>
+              <a:buClr>
+                <a:schemeClr val="tx2"/>
+              </a:buClr>
+              <a:buSzPct val="70000"/>
+              <a:buFont typeface="Wingdings 2" charset="2"/>
+              <a:buChar char=""/>
+              <a:defRPr sz="2100" kern="1200">
+                <a:ln>
+                  <a:solidFill>
+                    <a:schemeClr val="bg1">
+                      <a:lumMod val="75000"/>
+                      <a:lumOff val="25000"/>
+                      <a:alpha val="10000"/>
+                    </a:schemeClr>
+                  </a:solidFill>
+                </a:ln>
+                <a:solidFill>
+                  <a:schemeClr val="tx2"/>
+                </a:solidFill>
+                <a:effectLst>
+                  <a:outerShdw blurRad="9525" dist="25400" dir="14640000" algn="tl" rotWithShape="0">
+                    <a:schemeClr val="bg1">
+                      <a:alpha val="30000"/>
+                    </a:schemeClr>
+                  </a:outerShdw>
+                </a:effectLst>
+                <a:latin typeface="+mn-lt"/>
+                <a:ea typeface="+mn-ea"/>
+                <a:cs typeface="+mn-cs"/>
+              </a:defRPr>
+            </a:lvl1pPr>
+            <a:lvl2pPr marL="720000" indent="-270000" algn="l" defTabSz="457200" rtl="0" eaLnBrk="1" latinLnBrk="0" hangingPunct="1">
+              <a:spcBef>
+                <a:spcPct val="20000"/>
+              </a:spcBef>
+              <a:spcAft>
+                <a:spcPts val="600"/>
+              </a:spcAft>
+              <a:buClr>
+                <a:schemeClr val="tx2"/>
+              </a:buClr>
+              <a:buSzPct val="70000"/>
+              <a:buFont typeface="Wingdings 2" charset="2"/>
+              <a:buChar char=""/>
+              <a:defRPr sz="1900" kern="1200">
+                <a:ln>
+                  <a:solidFill>
+                    <a:schemeClr val="bg1">
+                      <a:lumMod val="75000"/>
+                      <a:lumOff val="25000"/>
+                      <a:alpha val="10000"/>
+                    </a:schemeClr>
+                  </a:solidFill>
+                </a:ln>
+                <a:solidFill>
+                  <a:schemeClr val="tx2"/>
+                </a:solidFill>
+                <a:effectLst>
+                  <a:outerShdw blurRad="9525" dist="25400" dir="14640000" algn="tl" rotWithShape="0">
+                    <a:schemeClr val="bg1">
+                      <a:alpha val="30000"/>
+                    </a:schemeClr>
+                  </a:outerShdw>
+                </a:effectLst>
+                <a:latin typeface="+mn-lt"/>
+                <a:ea typeface="+mn-ea"/>
+                <a:cs typeface="+mn-cs"/>
+              </a:defRPr>
+            </a:lvl2pPr>
+            <a:lvl3pPr marL="1026000" indent="-216000" algn="l" defTabSz="457200" rtl="0" eaLnBrk="1" latinLnBrk="0" hangingPunct="1">
+              <a:spcBef>
+                <a:spcPct val="20000"/>
+              </a:spcBef>
+              <a:spcAft>
+                <a:spcPts val="600"/>
+              </a:spcAft>
+              <a:buClr>
+                <a:schemeClr val="tx2"/>
+              </a:buClr>
+              <a:buSzPct val="70000"/>
+              <a:buFont typeface="Wingdings 2" charset="2"/>
+              <a:buChar char=""/>
+              <a:defRPr sz="1700" kern="1200">
+                <a:ln>
+                  <a:solidFill>
+                    <a:schemeClr val="bg1">
+                      <a:lumMod val="75000"/>
+                      <a:lumOff val="25000"/>
+                      <a:alpha val="10000"/>
+                    </a:schemeClr>
+                  </a:solidFill>
+                </a:ln>
+                <a:solidFill>
+                  <a:schemeClr val="tx2"/>
+                </a:solidFill>
+                <a:effectLst>
+                  <a:outerShdw blurRad="9525" dist="25400" dir="14640000" algn="tl" rotWithShape="0">
+                    <a:schemeClr val="bg1">
+                      <a:alpha val="30000"/>
+                    </a:schemeClr>
+                  </a:outerShdw>
+                </a:effectLst>
+                <a:latin typeface="+mn-lt"/>
+                <a:ea typeface="+mn-ea"/>
+                <a:cs typeface="+mn-cs"/>
+              </a:defRPr>
+            </a:lvl3pPr>
+            <a:lvl4pPr marL="1386000" indent="-216000" algn="l" defTabSz="457200" rtl="0" eaLnBrk="1" latinLnBrk="0" hangingPunct="1">
+              <a:spcBef>
+                <a:spcPct val="20000"/>
+              </a:spcBef>
+              <a:spcAft>
+                <a:spcPts val="600"/>
+              </a:spcAft>
+              <a:buClr>
+                <a:schemeClr val="tx2"/>
+              </a:buClr>
+              <a:buSzPct val="70000"/>
+              <a:buFont typeface="Wingdings 2" charset="2"/>
+              <a:buChar char=""/>
+              <a:defRPr sz="1500" kern="1200">
+                <a:ln>
+                  <a:solidFill>
+                    <a:schemeClr val="bg1">
+                      <a:lumMod val="75000"/>
+                      <a:lumOff val="25000"/>
+                      <a:alpha val="10000"/>
+                    </a:schemeClr>
+                  </a:solidFill>
+                </a:ln>
+                <a:solidFill>
+                  <a:schemeClr val="tx2"/>
+                </a:solidFill>
+                <a:effectLst>
+                  <a:outerShdw blurRad="9525" dist="25400" dir="14640000" algn="tl" rotWithShape="0">
+                    <a:schemeClr val="bg1">
+                      <a:alpha val="30000"/>
+                    </a:schemeClr>
+                  </a:outerShdw>
+                </a:effectLst>
+                <a:latin typeface="+mn-lt"/>
+                <a:ea typeface="+mn-ea"/>
+                <a:cs typeface="+mn-cs"/>
+              </a:defRPr>
+            </a:lvl4pPr>
+            <a:lvl5pPr marL="1674000" indent="-216000" algn="l" defTabSz="457200" rtl="0" eaLnBrk="1" latinLnBrk="0" hangingPunct="1">
+              <a:spcBef>
+                <a:spcPct val="20000"/>
+              </a:spcBef>
+              <a:spcAft>
+                <a:spcPts val="600"/>
+              </a:spcAft>
+              <a:buClr>
+                <a:schemeClr val="tx2"/>
+              </a:buClr>
+              <a:buSzPct val="70000"/>
+              <a:buFont typeface="Wingdings 2" charset="2"/>
+              <a:buChar char=""/>
+              <a:defRPr sz="1500" kern="1200">
+                <a:ln>
+                  <a:solidFill>
+                    <a:schemeClr val="bg1">
+                      <a:lumMod val="75000"/>
+                      <a:lumOff val="25000"/>
+                      <a:alpha val="10000"/>
+                    </a:schemeClr>
+                  </a:solidFill>
+                </a:ln>
+                <a:solidFill>
+                  <a:schemeClr val="tx2"/>
+                </a:solidFill>
+                <a:effectLst>
+                  <a:outerShdw blurRad="9525" dist="25400" dir="14640000" algn="tl" rotWithShape="0">
+                    <a:schemeClr val="bg1">
+                      <a:alpha val="30000"/>
+                    </a:schemeClr>
+                  </a:outerShdw>
+                </a:effectLst>
+                <a:latin typeface="+mn-lt"/>
+                <a:ea typeface="+mn-ea"/>
+                <a:cs typeface="+mn-cs"/>
+              </a:defRPr>
+            </a:lvl5pPr>
+            <a:lvl6pPr marL="2014600" indent="-228600" algn="l" defTabSz="457200" rtl="0" eaLnBrk="1" latinLnBrk="0" hangingPunct="1">
+              <a:spcBef>
+                <a:spcPct val="20000"/>
+              </a:spcBef>
+              <a:spcAft>
+                <a:spcPts val="600"/>
+              </a:spcAft>
+              <a:buClr>
+                <a:schemeClr val="tx2"/>
+              </a:buClr>
+              <a:buSzPct val="70000"/>
+              <a:buFont typeface="Wingdings 2" charset="2"/>
+              <a:buChar char=""/>
+              <a:defRPr sz="1400" kern="1200">
+                <a:ln>
+                  <a:solidFill>
+                    <a:schemeClr val="bg1">
+                      <a:lumMod val="75000"/>
+                      <a:lumOff val="25000"/>
+                      <a:alpha val="10000"/>
+                    </a:schemeClr>
+                  </a:solidFill>
+                </a:ln>
+                <a:solidFill>
+                  <a:schemeClr val="tx2"/>
+                </a:solidFill>
+                <a:effectLst>
+                  <a:outerShdw blurRad="9525" dist="25400" dir="14640000" algn="tl" rotWithShape="0">
+                    <a:schemeClr val="bg1">
+                      <a:alpha val="30000"/>
+                    </a:schemeClr>
+                  </a:outerShdw>
+                </a:effectLst>
+                <a:latin typeface="+mn-lt"/>
+                <a:ea typeface="+mn-ea"/>
+                <a:cs typeface="+mn-cs"/>
+              </a:defRPr>
+            </a:lvl6pPr>
+            <a:lvl7pPr marL="2401800" indent="-228600" algn="l" defTabSz="457200" rtl="0" eaLnBrk="1" latinLnBrk="0" hangingPunct="1">
+              <a:spcBef>
+                <a:spcPct val="20000"/>
+              </a:spcBef>
+              <a:spcAft>
+                <a:spcPts val="600"/>
+              </a:spcAft>
+              <a:buClr>
+                <a:schemeClr val="tx2"/>
+              </a:buClr>
+              <a:buSzPct val="70000"/>
+              <a:buFont typeface="Wingdings 2" charset="2"/>
+              <a:buChar char=""/>
+              <a:defRPr sz="1400" kern="1200">
+                <a:ln>
+                  <a:solidFill>
+                    <a:schemeClr val="bg1">
+                      <a:lumMod val="75000"/>
+                      <a:lumOff val="25000"/>
+                      <a:alpha val="10000"/>
+                    </a:schemeClr>
+                  </a:solidFill>
+                </a:ln>
+                <a:solidFill>
+                  <a:schemeClr val="tx2"/>
+                </a:solidFill>
+                <a:effectLst>
+                  <a:outerShdw blurRad="9525" dist="25400" dir="14640000" algn="tl" rotWithShape="0">
+                    <a:schemeClr val="bg1">
+                      <a:alpha val="30000"/>
+                    </a:schemeClr>
+                  </a:outerShdw>
+                </a:effectLst>
+                <a:latin typeface="+mn-lt"/>
+                <a:ea typeface="+mn-ea"/>
+                <a:cs typeface="+mn-cs"/>
+              </a:defRPr>
+            </a:lvl7pPr>
+            <a:lvl8pPr marL="2789000" indent="-228600" algn="l" defTabSz="457200" rtl="0" eaLnBrk="1" latinLnBrk="0" hangingPunct="1">
+              <a:spcBef>
+                <a:spcPct val="20000"/>
+              </a:spcBef>
+              <a:spcAft>
+                <a:spcPts val="600"/>
+              </a:spcAft>
+              <a:buClr>
+                <a:schemeClr val="tx2"/>
+              </a:buClr>
+              <a:buSzPct val="70000"/>
+              <a:buFont typeface="Wingdings 2" charset="2"/>
+              <a:buChar char=""/>
+              <a:defRPr sz="1400" kern="1200">
+                <a:ln>
+                  <a:solidFill>
+                    <a:schemeClr val="bg1">
+                      <a:lumMod val="75000"/>
+                      <a:lumOff val="25000"/>
+                      <a:alpha val="10000"/>
+                    </a:schemeClr>
+                  </a:solidFill>
+                </a:ln>
+                <a:solidFill>
+                  <a:schemeClr val="tx2"/>
+                </a:solidFill>
+                <a:effectLst>
+                  <a:outerShdw blurRad="9525" dist="25400" dir="14640000" algn="tl" rotWithShape="0">
+                    <a:schemeClr val="bg1">
+                      <a:alpha val="30000"/>
+                    </a:schemeClr>
+                  </a:outerShdw>
+                </a:effectLst>
+                <a:latin typeface="+mn-lt"/>
+                <a:ea typeface="+mn-ea"/>
+                <a:cs typeface="+mn-cs"/>
+              </a:defRPr>
+            </a:lvl8pPr>
+            <a:lvl9pPr marL="3106200" indent="-228600" algn="l" defTabSz="457200" rtl="0" eaLnBrk="1" latinLnBrk="0" hangingPunct="1">
+              <a:spcBef>
+                <a:spcPct val="20000"/>
+              </a:spcBef>
+              <a:spcAft>
+                <a:spcPts val="600"/>
+              </a:spcAft>
+              <a:buClr>
+                <a:schemeClr val="tx2"/>
+              </a:buClr>
+              <a:buSzPct val="70000"/>
+              <a:buFont typeface="Wingdings 2" charset="2"/>
+              <a:buChar char=""/>
+              <a:defRPr sz="1400" kern="1200">
+                <a:ln>
+                  <a:solidFill>
+                    <a:schemeClr val="bg1">
+                      <a:lumMod val="75000"/>
+                      <a:lumOff val="25000"/>
+                      <a:alpha val="10000"/>
+                    </a:schemeClr>
+                  </a:solidFill>
+                </a:ln>
+                <a:solidFill>
+                  <a:schemeClr val="tx2"/>
+                </a:solidFill>
+                <a:effectLst>
+                  <a:outerShdw blurRad="9525" dist="25400" dir="14640000" algn="tl" rotWithShape="0">
+                    <a:schemeClr val="bg1">
+                      <a:alpha val="30000"/>
+                    </a:schemeClr>
+                  </a:outerShdw>
+                </a:effectLst>
+                <a:latin typeface="+mn-lt"/>
+                <a:ea typeface="+mn-ea"/>
+                <a:cs typeface="+mn-cs"/>
+              </a:defRPr>
+            </a:lvl9pPr>
+          </a:lstStyle>
+          <a:p>
+            <a:r>
+              <a:rPr lang="en-GB" sz="2400" dirty="0"/>
+              <a:t>Certain sequences of words give away whether the review is positive or negative regardless of there position.  CNN is perfect.</a:t>
+            </a:r>
+          </a:p>
+        </p:txBody>
+      </p:sp>
+    </p:spTree>
+    <p:extLst>
+      <p:ext uri="{BB962C8B-B14F-4D97-AF65-F5344CB8AC3E}">
+        <p14:creationId xmlns:p14="http://schemas.microsoft.com/office/powerpoint/2010/main" val="3607325391"/>
+      </p:ext>
+    </p:extLst>
+  </p:cSld>
+  <p:clrMapOvr>
+    <a:masterClrMapping/>
+  </p:clrMapOvr>
+  <p:timing>
+    <p:tnLst>
+      <p:par>
+        <p:cTn id="1" dur="indefinite" restart="never" nodeType="tmRoot">
+          <p:childTnLst>
+            <p:seq concurrent="1" nextAc="seek">
+              <p:cTn id="2" dur="indefinite" nodeType="mainSeq">
+                <p:childTnLst>
+                  <p:par>
+                    <p:cTn id="3" fill="hold">
+                      <p:stCondLst>
+                        <p:cond delay="indefinite"/>
+                      </p:stCondLst>
+                      <p:childTnLst>
+                        <p:par>
+                          <p:cTn id="4" fill="hold">
+                            <p:stCondLst>
+                              <p:cond delay="0"/>
+                            </p:stCondLst>
+                            <p:childTnLst>
+                              <p:par>
+                                <p:cTn id="5" presetID="10" presetClass="entr" presetSubtype="0" fill="hold" nodeType="clickEffect">
+                                  <p:stCondLst>
+                                    <p:cond delay="0"/>
+                                  </p:stCondLst>
+                                  <p:childTnLst>
+                                    <p:set>
+                                      <p:cBhvr>
+                                        <p:cTn id="6" dur="1" fill="hold">
+                                          <p:stCondLst>
+                                            <p:cond delay="0"/>
+                                          </p:stCondLst>
+                                        </p:cTn>
+                                        <p:tgtEl>
+                                          <p:spTgt spid="3">
+                                            <p:txEl>
+                                              <p:pRg st="0" end="0"/>
+                                            </p:txEl>
+                                          </p:spTgt>
+                                        </p:tgtEl>
+                                        <p:attrNameLst>
+                                          <p:attrName>style.visibility</p:attrName>
+                                        </p:attrNameLst>
+                                      </p:cBhvr>
+                                      <p:to>
+                                        <p:strVal val="visible"/>
+                                      </p:to>
+                                    </p:set>
+                                    <p:animEffect transition="in" filter="fade">
+                                      <p:cBhvr>
+                                        <p:cTn id="7" dur="500"/>
+                                        <p:tgtEl>
+                                          <p:spTgt spid="3">
+                                            <p:txEl>
+                                              <p:pRg st="0" end="0"/>
+                                            </p:txEl>
+                                          </p:spTgt>
+                                        </p:tgtEl>
+                                      </p:cBhvr>
+                                    </p:animEffect>
+                                  </p:childTnLst>
+                                </p:cTn>
+                              </p:par>
+                            </p:childTnLst>
+                          </p:cTn>
+                        </p:par>
+                      </p:childTnLst>
+                    </p:cTn>
+                  </p:par>
+                  <p:par>
+                    <p:cTn id="8" fill="hold">
+                      <p:stCondLst>
+                        <p:cond delay="indefinite"/>
+                      </p:stCondLst>
+                      <p:childTnLst>
+                        <p:par>
+                          <p:cTn id="9" fill="hold">
+                            <p:stCondLst>
+                              <p:cond delay="0"/>
+                            </p:stCondLst>
+                            <p:childTnLst>
+                              <p:par>
+                                <p:cTn id="10" presetID="10" presetClass="entr" presetSubtype="0" fill="hold" nodeType="clickEffect">
+                                  <p:stCondLst>
+                                    <p:cond delay="0"/>
+                                  </p:stCondLst>
+                                  <p:childTnLst>
+                                    <p:set>
+                                      <p:cBhvr>
+                                        <p:cTn id="11" dur="1" fill="hold">
+                                          <p:stCondLst>
+                                            <p:cond delay="0"/>
+                                          </p:stCondLst>
+                                        </p:cTn>
+                                        <p:tgtEl>
+                                          <p:spTgt spid="3">
+                                            <p:txEl>
+                                              <p:pRg st="1" end="1"/>
+                                            </p:txEl>
+                                          </p:spTgt>
+                                        </p:tgtEl>
+                                        <p:attrNameLst>
+                                          <p:attrName>style.visibility</p:attrName>
+                                        </p:attrNameLst>
+                                      </p:cBhvr>
+                                      <p:to>
+                                        <p:strVal val="visible"/>
+                                      </p:to>
+                                    </p:set>
+                                    <p:animEffect transition="in" filter="fade">
+                                      <p:cBhvr>
+                                        <p:cTn id="12" dur="500"/>
+                                        <p:tgtEl>
+                                          <p:spTgt spid="3">
+                                            <p:txEl>
+                                              <p:pRg st="1" end="1"/>
+                                            </p:txEl>
+                                          </p:spTgt>
+                                        </p:tgtEl>
+                                      </p:cBhvr>
+                                    </p:animEffect>
+                                  </p:childTnLst>
+                                </p:cTn>
+                              </p:par>
+                            </p:childTnLst>
+                          </p:cTn>
+                        </p:par>
+                      </p:childTnLst>
+                    </p:cTn>
+                  </p:par>
+                  <p:par>
+                    <p:cTn id="13" fill="hold">
+                      <p:stCondLst>
+                        <p:cond delay="indefinite"/>
+                      </p:stCondLst>
+                      <p:childTnLst>
+                        <p:par>
+                          <p:cTn id="14" fill="hold">
+                            <p:stCondLst>
+                              <p:cond delay="0"/>
+                            </p:stCondLst>
+                            <p:childTnLst>
+                              <p:par>
+                                <p:cTn id="15" presetID="10" presetClass="entr" presetSubtype="0" fill="hold" nodeType="clickEffect">
+                                  <p:stCondLst>
+                                    <p:cond delay="0"/>
+                                  </p:stCondLst>
+                                  <p:childTnLst>
+                                    <p:set>
+                                      <p:cBhvr>
+                                        <p:cTn id="16" dur="1" fill="hold">
+                                          <p:stCondLst>
+                                            <p:cond delay="0"/>
+                                          </p:stCondLst>
+                                        </p:cTn>
+                                        <p:tgtEl>
+                                          <p:spTgt spid="1028"/>
+                                        </p:tgtEl>
+                                        <p:attrNameLst>
+                                          <p:attrName>style.visibility</p:attrName>
+                                        </p:attrNameLst>
+                                      </p:cBhvr>
+                                      <p:to>
+                                        <p:strVal val="visible"/>
+                                      </p:to>
+                                    </p:set>
+                                    <p:animEffect transition="in" filter="fade">
+                                      <p:cBhvr>
+                                        <p:cTn id="17" dur="500"/>
+                                        <p:tgtEl>
+                                          <p:spTgt spid="1028"/>
+                                        </p:tgtEl>
+                                      </p:cBhvr>
+                                    </p:animEffect>
+                                  </p:childTnLst>
+                                </p:cTn>
+                              </p:par>
+                            </p:childTnLst>
+                          </p:cTn>
+                        </p:par>
+                      </p:childTnLst>
+                    </p:cTn>
+                  </p:par>
+                  <p:par>
+                    <p:cTn id="18" fill="hold">
+                      <p:stCondLst>
+                        <p:cond delay="indefinite"/>
+                      </p:stCondLst>
+                      <p:childTnLst>
+                        <p:par>
+                          <p:cTn id="19" fill="hold">
+                            <p:stCondLst>
+                              <p:cond delay="0"/>
+                            </p:stCondLst>
+                            <p:childTnLst>
+                              <p:par>
+                                <p:cTn id="20" presetID="10" presetClass="entr" presetSubtype="0" fill="hold" nodeType="clickEffect">
+                                  <p:stCondLst>
+                                    <p:cond delay="0"/>
+                                  </p:stCondLst>
+                                  <p:childTnLst>
+                                    <p:set>
+                                      <p:cBhvr>
+                                        <p:cTn id="21" dur="1" fill="hold">
+                                          <p:stCondLst>
+                                            <p:cond delay="0"/>
+                                          </p:stCondLst>
+                                        </p:cTn>
+                                        <p:tgtEl>
+                                          <p:spTgt spid="8">
+                                            <p:txEl>
+                                              <p:pRg st="0" end="0"/>
+                                            </p:txEl>
+                                          </p:spTgt>
+                                        </p:tgtEl>
+                                        <p:attrNameLst>
+                                          <p:attrName>style.visibility</p:attrName>
+                                        </p:attrNameLst>
+                                      </p:cBhvr>
+                                      <p:to>
+                                        <p:strVal val="visible"/>
+                                      </p:to>
+                                    </p:set>
+                                    <p:animEffect transition="in" filter="fade">
+                                      <p:cBhvr>
+                                        <p:cTn id="22" dur="500"/>
+                                        <p:tgtEl>
+                                          <p:spTgt spid="8">
+                                            <p:txEl>
+                                              <p:pRg st="0" end="0"/>
+                                            </p:txEl>
+                                          </p:spTgt>
+                                        </p:tgtEl>
+                                      </p:cBhvr>
+                                    </p:animEffect>
+                                  </p:childTnLst>
+                                </p:cTn>
+                              </p:par>
+                            </p:childTnLst>
+                          </p:cTn>
+                        </p:par>
+                      </p:childTnLst>
+                    </p:cTn>
+                  </p:par>
+                </p:childTnLst>
+              </p:cTn>
+              <p:prevCondLst>
+                <p:cond evt="onPrev" delay="0">
+                  <p:tgtEl>
+                    <p:sldTgt/>
+                  </p:tgtEl>
+                </p:cond>
+              </p:prevCondLst>
+              <p:nextCondLst>
+                <p:cond evt="onNext" delay="0">
+                  <p:tgtEl>
+                    <p:sldTgt/>
+                  </p:tgtEl>
+                </p:cond>
+              </p:nextCondLst>
+            </p:seq>
+          </p:childTnLst>
+        </p:cTn>
+      </p:par>
+    </p:tnLst>
+  </p:timing>
+</p:sld>
+</file>
+
+<file path=ppt/slides/slide4.xml><?xml version="1.0" encoding="utf-8"?>
+<p:sld xmlns:a="http://schemas.openxmlformats.org/drawingml/2006/main" xmlns:r="http://schemas.openxmlformats.org/officeDocument/2006/relationships" xmlns:p="http://schemas.openxmlformats.org/presentationml/2006/main">
+  <p:cSld>
+    <p:spTree>
+      <p:nvGrpSpPr>
+        <p:cNvPr id="1" name=""/>
+        <p:cNvGrpSpPr/>
+        <p:nvPr/>
+      </p:nvGrpSpPr>
+      <p:grpSpPr>
+        <a:xfrm>
+          <a:off x="0" y="0"/>
+          <a:ext cx="0" cy="0"/>
+          <a:chOff x="0" y="0"/>
+          <a:chExt cx="0" cy="0"/>
+        </a:xfrm>
+      </p:grpSpPr>
+      <p:sp>
+        <p:nvSpPr>
+          <p:cNvPr id="2" name="Title 1">
+            <a:extLst>
+              <a:ext uri="{FF2B5EF4-FFF2-40B4-BE49-F238E27FC236}">
+                <a16:creationId xmlns:a16="http://schemas.microsoft.com/office/drawing/2014/main" id="{4E066D19-FB16-4C5F-B9D7-99948EA4A90F}"/>
+              </a:ext>
+            </a:extLst>
+          </p:cNvPr>
+          <p:cNvSpPr>
+            <a:spLocks noGrp="1"/>
+          </p:cNvSpPr>
+          <p:nvPr>
+            <p:ph type="title"/>
+          </p:nvPr>
+        </p:nvSpPr>
+        <p:spPr/>
+        <p:txBody>
+          <a:bodyPr>
+            <a:normAutofit/>
+          </a:bodyPr>
+          <a:lstStyle/>
+          <a:p>
+            <a:r>
+              <a:rPr lang="en-GB" sz="4000" dirty="0">
+                <a:latin typeface="+mn-lt"/>
+              </a:rPr>
+              <a:t>What is a CNN</a:t>
+            </a:r>
+          </a:p>
+        </p:txBody>
+      </p:sp>
+      <p:sp>
+        <p:nvSpPr>
+          <p:cNvPr id="3" name="Content Placeholder 2">
+            <a:extLst>
+              <a:ext uri="{FF2B5EF4-FFF2-40B4-BE49-F238E27FC236}">
+                <a16:creationId xmlns:a16="http://schemas.microsoft.com/office/drawing/2014/main" id="{38A49A37-8875-4144-BB26-DD7064C84A61}"/>
+              </a:ext>
+            </a:extLst>
+          </p:cNvPr>
+          <p:cNvSpPr>
+            <a:spLocks noGrp="1"/>
+          </p:cNvSpPr>
+          <p:nvPr>
+            <p:ph idx="1"/>
+          </p:nvPr>
+        </p:nvSpPr>
+        <p:spPr>
+          <a:xfrm>
+            <a:off x="913795" y="1619251"/>
+            <a:ext cx="10353762" cy="1585632"/>
+          </a:xfrm>
+        </p:spPr>
+        <p:txBody>
+          <a:bodyPr>
+            <a:normAutofit/>
+          </a:bodyPr>
+          <a:lstStyle/>
+          <a:p>
+            <a:r>
+              <a:rPr lang="en-GB" sz="2400" dirty="0"/>
+              <a:t>Takes as input matrices. RGB image means one matrix per channel.</a:t>
+            </a:r>
+          </a:p>
+          <a:p>
+            <a:r>
+              <a:rPr lang="en-GB" sz="2400" dirty="0"/>
+              <a:t>Feature Selector is made up of layers of Convolution followed by Pooling.  Convolution is sliding a kernel/filter over the input to create a response map</a:t>
+            </a:r>
+          </a:p>
+        </p:txBody>
+      </p:sp>
+      <p:pic>
+        <p:nvPicPr>
+          <p:cNvPr id="5" name="Picture 4">
+            <a:extLst>
+              <a:ext uri="{FF2B5EF4-FFF2-40B4-BE49-F238E27FC236}">
+                <a16:creationId xmlns:a16="http://schemas.microsoft.com/office/drawing/2014/main" id="{7DF91389-3919-42AE-8BA7-AB243408FCD0}"/>
+              </a:ext>
+            </a:extLst>
+          </p:cNvPr>
+          <p:cNvPicPr>
+            <a:picLocks noChangeAspect="1"/>
+          </p:cNvPicPr>
+          <p:nvPr/>
+        </p:nvPicPr>
+        <p:blipFill>
+          <a:blip r:embed="rId2"/>
+          <a:stretch>
+            <a:fillRect/>
+          </a:stretch>
+        </p:blipFill>
+        <p:spPr>
+          <a:xfrm>
+            <a:off x="3610183" y="3300605"/>
+            <a:ext cx="4458962" cy="1908538"/>
+          </a:xfrm>
+          <a:prstGeom prst="rect">
+            <a:avLst/>
+          </a:prstGeom>
+        </p:spPr>
+      </p:pic>
+      <p:sp>
+        <p:nvSpPr>
+          <p:cNvPr id="8" name="Content Placeholder 2">
+            <a:extLst>
+              <a:ext uri="{FF2B5EF4-FFF2-40B4-BE49-F238E27FC236}">
+                <a16:creationId xmlns:a16="http://schemas.microsoft.com/office/drawing/2014/main" id="{3BDF720C-F13E-4C46-AAA0-EB1DF0C5CA8D}"/>
+              </a:ext>
+            </a:extLst>
+          </p:cNvPr>
+          <p:cNvSpPr txBox="1">
+            <a:spLocks/>
+          </p:cNvSpPr>
+          <p:nvPr/>
+        </p:nvSpPr>
+        <p:spPr>
+          <a:xfrm>
+            <a:off x="662783" y="5304866"/>
+            <a:ext cx="10353762" cy="1257300"/>
           </a:xfrm>
           <a:prstGeom prst="rect">
             <a:avLst/>
@@ -7884,481 +8593,16 @@
             </a:lvl9pPr>
           </a:lstStyle>
           <a:p>
-            <a:r>
-              <a:rPr lang="en-GB" dirty="0"/>
-              <a:t>However for sentiment analysis certain sequences of words give away whether the review is positive or negative regardless of there position</a:t>
-            </a:r>
-          </a:p>
-          <a:p>
-            <a:r>
-              <a:rPr lang="en-GB" dirty="0"/>
-              <a:t> CNN perfect for this as will learn to detect these local sequences of words</a:t>
-            </a:r>
-          </a:p>
-        </p:txBody>
-      </p:sp>
-    </p:spTree>
-    <p:extLst>
-      <p:ext uri="{BB962C8B-B14F-4D97-AF65-F5344CB8AC3E}">
-        <p14:creationId xmlns:p14="http://schemas.microsoft.com/office/powerpoint/2010/main" val="3607325391"/>
-      </p:ext>
-    </p:extLst>
-  </p:cSld>
-  <p:clrMapOvr>
-    <a:masterClrMapping/>
-  </p:clrMapOvr>
-  <p:timing>
-    <p:tnLst>
-      <p:par>
-        <p:cTn id="1" dur="indefinite" restart="never" nodeType="tmRoot">
-          <p:childTnLst>
-            <p:seq concurrent="1" nextAc="seek">
-              <p:cTn id="2" dur="indefinite" nodeType="mainSeq">
-                <p:childTnLst>
-                  <p:par>
-                    <p:cTn id="3" fill="hold">
-                      <p:stCondLst>
-                        <p:cond delay="indefinite"/>
-                      </p:stCondLst>
-                      <p:childTnLst>
-                        <p:par>
-                          <p:cTn id="4" fill="hold">
-                            <p:stCondLst>
-                              <p:cond delay="0"/>
-                            </p:stCondLst>
-                            <p:childTnLst>
-                              <p:par>
-                                <p:cTn id="5" presetID="10" presetClass="entr" presetSubtype="0" fill="hold" nodeType="clickEffect">
-                                  <p:stCondLst>
-                                    <p:cond delay="0"/>
-                                  </p:stCondLst>
-                                  <p:childTnLst>
-                                    <p:set>
-                                      <p:cBhvr>
-                                        <p:cTn id="6" dur="1" fill="hold">
-                                          <p:stCondLst>
-                                            <p:cond delay="0"/>
-                                          </p:stCondLst>
-                                        </p:cTn>
-                                        <p:tgtEl>
-                                          <p:spTgt spid="3">
-                                            <p:txEl>
-                                              <p:pRg st="0" end="0"/>
-                                            </p:txEl>
-                                          </p:spTgt>
-                                        </p:tgtEl>
-                                        <p:attrNameLst>
-                                          <p:attrName>style.visibility</p:attrName>
-                                        </p:attrNameLst>
-                                      </p:cBhvr>
-                                      <p:to>
-                                        <p:strVal val="visible"/>
-                                      </p:to>
-                                    </p:set>
-                                    <p:animEffect transition="in" filter="fade">
-                                      <p:cBhvr>
-                                        <p:cTn id="7" dur="500"/>
-                                        <p:tgtEl>
-                                          <p:spTgt spid="3">
-                                            <p:txEl>
-                                              <p:pRg st="0" end="0"/>
-                                            </p:txEl>
-                                          </p:spTgt>
-                                        </p:tgtEl>
-                                      </p:cBhvr>
-                                    </p:animEffect>
-                                  </p:childTnLst>
-                                </p:cTn>
-                              </p:par>
-                            </p:childTnLst>
-                          </p:cTn>
-                        </p:par>
-                      </p:childTnLst>
-                    </p:cTn>
-                  </p:par>
-                  <p:par>
-                    <p:cTn id="8" fill="hold">
-                      <p:stCondLst>
-                        <p:cond delay="indefinite"/>
-                      </p:stCondLst>
-                      <p:childTnLst>
-                        <p:par>
-                          <p:cTn id="9" fill="hold">
-                            <p:stCondLst>
-                              <p:cond delay="0"/>
-                            </p:stCondLst>
-                            <p:childTnLst>
-                              <p:par>
-                                <p:cTn id="10" presetID="10" presetClass="entr" presetSubtype="0" fill="hold" nodeType="clickEffect">
-                                  <p:stCondLst>
-                                    <p:cond delay="0"/>
-                                  </p:stCondLst>
-                                  <p:childTnLst>
-                                    <p:set>
-                                      <p:cBhvr>
-                                        <p:cTn id="11" dur="1" fill="hold">
-                                          <p:stCondLst>
-                                            <p:cond delay="0"/>
-                                          </p:stCondLst>
-                                        </p:cTn>
-                                        <p:tgtEl>
-                                          <p:spTgt spid="3">
-                                            <p:txEl>
-                                              <p:pRg st="1" end="1"/>
-                                            </p:txEl>
-                                          </p:spTgt>
-                                        </p:tgtEl>
-                                        <p:attrNameLst>
-                                          <p:attrName>style.visibility</p:attrName>
-                                        </p:attrNameLst>
-                                      </p:cBhvr>
-                                      <p:to>
-                                        <p:strVal val="visible"/>
-                                      </p:to>
-                                    </p:set>
-                                    <p:animEffect transition="in" filter="fade">
-                                      <p:cBhvr>
-                                        <p:cTn id="12" dur="500"/>
-                                        <p:tgtEl>
-                                          <p:spTgt spid="3">
-                                            <p:txEl>
-                                              <p:pRg st="1" end="1"/>
-                                            </p:txEl>
-                                          </p:spTgt>
-                                        </p:tgtEl>
-                                      </p:cBhvr>
-                                    </p:animEffect>
-                                  </p:childTnLst>
-                                </p:cTn>
-                              </p:par>
-                            </p:childTnLst>
-                          </p:cTn>
-                        </p:par>
-                      </p:childTnLst>
-                    </p:cTn>
-                  </p:par>
-                  <p:par>
-                    <p:cTn id="13" fill="hold">
-                      <p:stCondLst>
-                        <p:cond delay="indefinite"/>
-                      </p:stCondLst>
-                      <p:childTnLst>
-                        <p:par>
-                          <p:cTn id="14" fill="hold">
-                            <p:stCondLst>
-                              <p:cond delay="0"/>
-                            </p:stCondLst>
-                            <p:childTnLst>
-                              <p:par>
-                                <p:cTn id="15" presetID="10" presetClass="entr" presetSubtype="0" fill="hold" nodeType="clickEffect">
-                                  <p:stCondLst>
-                                    <p:cond delay="0"/>
-                                  </p:stCondLst>
-                                  <p:childTnLst>
-                                    <p:set>
-                                      <p:cBhvr>
-                                        <p:cTn id="16" dur="1" fill="hold">
-                                          <p:stCondLst>
-                                            <p:cond delay="0"/>
-                                          </p:stCondLst>
-                                        </p:cTn>
-                                        <p:tgtEl>
-                                          <p:spTgt spid="1028"/>
-                                        </p:tgtEl>
-                                        <p:attrNameLst>
-                                          <p:attrName>style.visibility</p:attrName>
-                                        </p:attrNameLst>
-                                      </p:cBhvr>
-                                      <p:to>
-                                        <p:strVal val="visible"/>
-                                      </p:to>
-                                    </p:set>
-                                    <p:animEffect transition="in" filter="fade">
-                                      <p:cBhvr>
-                                        <p:cTn id="17" dur="500"/>
-                                        <p:tgtEl>
-                                          <p:spTgt spid="1028"/>
-                                        </p:tgtEl>
-                                      </p:cBhvr>
-                                    </p:animEffect>
-                                  </p:childTnLst>
-                                </p:cTn>
-                              </p:par>
-                            </p:childTnLst>
-                          </p:cTn>
-                        </p:par>
-                      </p:childTnLst>
-                    </p:cTn>
-                  </p:par>
-                  <p:par>
-                    <p:cTn id="18" fill="hold">
-                      <p:stCondLst>
-                        <p:cond delay="indefinite"/>
-                      </p:stCondLst>
-                      <p:childTnLst>
-                        <p:par>
-                          <p:cTn id="19" fill="hold">
-                            <p:stCondLst>
-                              <p:cond delay="0"/>
-                            </p:stCondLst>
-                            <p:childTnLst>
-                              <p:par>
-                                <p:cTn id="20" presetID="10" presetClass="entr" presetSubtype="0" fill="hold" nodeType="clickEffect">
-                                  <p:stCondLst>
-                                    <p:cond delay="0"/>
-                                  </p:stCondLst>
-                                  <p:childTnLst>
-                                    <p:set>
-                                      <p:cBhvr>
-                                        <p:cTn id="21" dur="1" fill="hold">
-                                          <p:stCondLst>
-                                            <p:cond delay="0"/>
-                                          </p:stCondLst>
-                                        </p:cTn>
-                                        <p:tgtEl>
-                                          <p:spTgt spid="8">
-                                            <p:txEl>
-                                              <p:pRg st="0" end="0"/>
-                                            </p:txEl>
-                                          </p:spTgt>
-                                        </p:tgtEl>
-                                        <p:attrNameLst>
-                                          <p:attrName>style.visibility</p:attrName>
-                                        </p:attrNameLst>
-                                      </p:cBhvr>
-                                      <p:to>
-                                        <p:strVal val="visible"/>
-                                      </p:to>
-                                    </p:set>
-                                    <p:animEffect transition="in" filter="fade">
-                                      <p:cBhvr>
-                                        <p:cTn id="22" dur="500"/>
-                                        <p:tgtEl>
-                                          <p:spTgt spid="8">
-                                            <p:txEl>
-                                              <p:pRg st="0" end="0"/>
-                                            </p:txEl>
-                                          </p:spTgt>
-                                        </p:tgtEl>
-                                      </p:cBhvr>
-                                    </p:animEffect>
-                                  </p:childTnLst>
-                                </p:cTn>
-                              </p:par>
-                            </p:childTnLst>
-                          </p:cTn>
-                        </p:par>
-                      </p:childTnLst>
-                    </p:cTn>
-                  </p:par>
-                  <p:par>
-                    <p:cTn id="23" fill="hold">
-                      <p:stCondLst>
-                        <p:cond delay="indefinite"/>
-                      </p:stCondLst>
-                      <p:childTnLst>
-                        <p:par>
-                          <p:cTn id="24" fill="hold">
-                            <p:stCondLst>
-                              <p:cond delay="0"/>
-                            </p:stCondLst>
-                            <p:childTnLst>
-                              <p:par>
-                                <p:cTn id="25" presetID="10" presetClass="entr" presetSubtype="0" fill="hold" nodeType="clickEffect">
-                                  <p:stCondLst>
-                                    <p:cond delay="0"/>
-                                  </p:stCondLst>
-                                  <p:childTnLst>
-                                    <p:set>
-                                      <p:cBhvr>
-                                        <p:cTn id="26" dur="1" fill="hold">
-                                          <p:stCondLst>
-                                            <p:cond delay="0"/>
-                                          </p:stCondLst>
-                                        </p:cTn>
-                                        <p:tgtEl>
-                                          <p:spTgt spid="8">
-                                            <p:txEl>
-                                              <p:pRg st="1" end="1"/>
-                                            </p:txEl>
-                                          </p:spTgt>
-                                        </p:tgtEl>
-                                        <p:attrNameLst>
-                                          <p:attrName>style.visibility</p:attrName>
-                                        </p:attrNameLst>
-                                      </p:cBhvr>
-                                      <p:to>
-                                        <p:strVal val="visible"/>
-                                      </p:to>
-                                    </p:set>
-                                    <p:animEffect transition="in" filter="fade">
-                                      <p:cBhvr>
-                                        <p:cTn id="27" dur="500"/>
-                                        <p:tgtEl>
-                                          <p:spTgt spid="8">
-                                            <p:txEl>
-                                              <p:pRg st="1" end="1"/>
-                                            </p:txEl>
-                                          </p:spTgt>
-                                        </p:tgtEl>
-                                      </p:cBhvr>
-                                    </p:animEffect>
-                                  </p:childTnLst>
-                                </p:cTn>
-                              </p:par>
-                            </p:childTnLst>
-                          </p:cTn>
-                        </p:par>
-                      </p:childTnLst>
-                    </p:cTn>
-                  </p:par>
-                </p:childTnLst>
-              </p:cTn>
-              <p:prevCondLst>
-                <p:cond evt="onPrev" delay="0">
-                  <p:tgtEl>
-                    <p:sldTgt/>
-                  </p:tgtEl>
-                </p:cond>
-              </p:prevCondLst>
-              <p:nextCondLst>
-                <p:cond evt="onNext" delay="0">
-                  <p:tgtEl>
-                    <p:sldTgt/>
-                  </p:tgtEl>
-                </p:cond>
-              </p:nextCondLst>
-            </p:seq>
-          </p:childTnLst>
-        </p:cTn>
-      </p:par>
-    </p:tnLst>
-  </p:timing>
-</p:sld>
-</file>
-
-<file path=ppt/slides/slide4.xml><?xml version="1.0" encoding="utf-8"?>
-<p:sld xmlns:a="http://schemas.openxmlformats.org/drawingml/2006/main" xmlns:r="http://schemas.openxmlformats.org/officeDocument/2006/relationships" xmlns:p="http://schemas.openxmlformats.org/presentationml/2006/main">
-  <p:cSld>
-    <p:spTree>
-      <p:nvGrpSpPr>
-        <p:cNvPr id="1" name=""/>
-        <p:cNvGrpSpPr/>
-        <p:nvPr/>
-      </p:nvGrpSpPr>
-      <p:grpSpPr>
-        <a:xfrm>
-          <a:off x="0" y="0"/>
-          <a:ext cx="0" cy="0"/>
-          <a:chOff x="0" y="0"/>
-          <a:chExt cx="0" cy="0"/>
-        </a:xfrm>
-      </p:grpSpPr>
-      <p:sp>
-        <p:nvSpPr>
-          <p:cNvPr id="2" name="Title 1">
+            <a:endParaRPr lang="en-GB" dirty="0"/>
+          </a:p>
+        </p:txBody>
+      </p:sp>
+      <p:sp>
+        <p:nvSpPr>
+          <p:cNvPr id="9" name="Content Placeholder 2">
             <a:extLst>
               <a:ext uri="{FF2B5EF4-FFF2-40B4-BE49-F238E27FC236}">
-                <a16:creationId xmlns:a16="http://schemas.microsoft.com/office/drawing/2014/main" id="{4E066D19-FB16-4C5F-B9D7-99948EA4A90F}"/>
-              </a:ext>
-            </a:extLst>
-          </p:cNvPr>
-          <p:cNvSpPr>
-            <a:spLocks noGrp="1"/>
-          </p:cNvSpPr>
-          <p:nvPr>
-            <p:ph type="title"/>
-          </p:nvPr>
-        </p:nvSpPr>
-        <p:spPr/>
-        <p:txBody>
-          <a:bodyPr/>
-          <a:lstStyle/>
-          <a:p>
-            <a:r>
-              <a:rPr lang="en-GB" dirty="0"/>
-              <a:t>What is a CNN</a:t>
-            </a:r>
-          </a:p>
-        </p:txBody>
-      </p:sp>
-      <p:sp>
-        <p:nvSpPr>
-          <p:cNvPr id="3" name="Content Placeholder 2">
-            <a:extLst>
-              <a:ext uri="{FF2B5EF4-FFF2-40B4-BE49-F238E27FC236}">
-                <a16:creationId xmlns:a16="http://schemas.microsoft.com/office/drawing/2014/main" id="{38A49A37-8875-4144-BB26-DD7064C84A61}"/>
-              </a:ext>
-            </a:extLst>
-          </p:cNvPr>
-          <p:cNvSpPr>
-            <a:spLocks noGrp="1"/>
-          </p:cNvSpPr>
-          <p:nvPr>
-            <p:ph idx="1"/>
-          </p:nvPr>
-        </p:nvSpPr>
-        <p:spPr>
-          <a:xfrm>
-            <a:off x="913795" y="1619251"/>
-            <a:ext cx="10353762" cy="1585632"/>
-          </a:xfrm>
-        </p:spPr>
-        <p:txBody>
-          <a:bodyPr>
-            <a:normAutofit lnSpcReduction="10000"/>
-          </a:bodyPr>
-          <a:lstStyle/>
-          <a:p>
-            <a:r>
-              <a:rPr lang="en-GB" dirty="0"/>
-              <a:t>Takes as input matrices. Most commonly an RGB image which means 1 matrix for each channel of the image</a:t>
-            </a:r>
-          </a:p>
-          <a:p>
-            <a:r>
-              <a:rPr lang="en-GB" dirty="0"/>
-              <a:t>Feature Selector is made up of layers of Convolution followed by Pooling.  Convolution is sliding a kernel/filter over the input to create a response map</a:t>
-            </a:r>
-          </a:p>
-        </p:txBody>
-      </p:sp>
-      <p:pic>
-        <p:nvPicPr>
-          <p:cNvPr id="5" name="Picture 4">
-            <a:extLst>
-              <a:ext uri="{FF2B5EF4-FFF2-40B4-BE49-F238E27FC236}">
-                <a16:creationId xmlns:a16="http://schemas.microsoft.com/office/drawing/2014/main" id="{7DF91389-3919-42AE-8BA7-AB243408FCD0}"/>
-              </a:ext>
-            </a:extLst>
-          </p:cNvPr>
-          <p:cNvPicPr>
-            <a:picLocks noChangeAspect="1"/>
-          </p:cNvPicPr>
-          <p:nvPr/>
-        </p:nvPicPr>
-        <p:blipFill>
-          <a:blip r:embed="rId2"/>
-          <a:stretch>
-            <a:fillRect/>
-          </a:stretch>
-        </p:blipFill>
-        <p:spPr>
-          <a:xfrm>
-            <a:off x="3292007" y="3204883"/>
-            <a:ext cx="4962525" cy="2124075"/>
-          </a:xfrm>
-          <a:prstGeom prst="rect">
-            <a:avLst/>
-          </a:prstGeom>
-        </p:spPr>
-      </p:pic>
-      <p:sp>
-        <p:nvSpPr>
-          <p:cNvPr id="8" name="Content Placeholder 2">
-            <a:extLst>
-              <a:ext uri="{FF2B5EF4-FFF2-40B4-BE49-F238E27FC236}">
-                <a16:creationId xmlns:a16="http://schemas.microsoft.com/office/drawing/2014/main" id="{3BDF720C-F13E-4C46-AAA0-EB1DF0C5CA8D}"/>
+                <a16:creationId xmlns:a16="http://schemas.microsoft.com/office/drawing/2014/main" id="{07358ED4-ABAA-4E7A-BB26-E3C2AE4A9313}"/>
               </a:ext>
             </a:extLst>
           </p:cNvPr>
@@ -8369,8 +8613,8 @@
         </p:nvSpPr>
         <p:spPr>
           <a:xfrm>
-            <a:off x="662783" y="5304866"/>
-            <a:ext cx="10353762" cy="1257300"/>
+            <a:off x="913795" y="5455584"/>
+            <a:ext cx="10353762" cy="1402416"/>
           </a:xfrm>
           <a:prstGeom prst="rect">
             <a:avLst/>
@@ -8735,16 +8979,432 @@
             </a:lvl9pPr>
           </a:lstStyle>
           <a:p>
+            <a:r>
+              <a:rPr lang="en-GB" sz="2400" dirty="0"/>
+              <a:t>Multiple filters produce multiple response maps. For example 64x64x3 RBG image -&gt; 60x60x32 using 32 4x4x3 filters cross-channel sum with no padding</a:t>
+            </a:r>
+          </a:p>
+          <a:p>
             <a:endParaRPr lang="en-GB" dirty="0"/>
           </a:p>
         </p:txBody>
       </p:sp>
-      <p:sp>
-        <p:nvSpPr>
-          <p:cNvPr id="9" name="Content Placeholder 2">
+    </p:spTree>
+    <p:extLst>
+      <p:ext uri="{BB962C8B-B14F-4D97-AF65-F5344CB8AC3E}">
+        <p14:creationId xmlns:p14="http://schemas.microsoft.com/office/powerpoint/2010/main" val="2044857651"/>
+      </p:ext>
+    </p:extLst>
+  </p:cSld>
+  <p:clrMapOvr>
+    <a:masterClrMapping/>
+  </p:clrMapOvr>
+  <p:timing>
+    <p:tnLst>
+      <p:par>
+        <p:cTn id="1" dur="indefinite" restart="never" nodeType="tmRoot">
+          <p:childTnLst>
+            <p:seq concurrent="1" nextAc="seek">
+              <p:cTn id="2" dur="indefinite" nodeType="mainSeq">
+                <p:childTnLst>
+                  <p:par>
+                    <p:cTn id="3" fill="hold">
+                      <p:stCondLst>
+                        <p:cond delay="indefinite"/>
+                      </p:stCondLst>
+                      <p:childTnLst>
+                        <p:par>
+                          <p:cTn id="4" fill="hold">
+                            <p:stCondLst>
+                              <p:cond delay="0"/>
+                            </p:stCondLst>
+                            <p:childTnLst>
+                              <p:par>
+                                <p:cTn id="5" presetID="10" presetClass="entr" presetSubtype="0" fill="hold" nodeType="clickEffect">
+                                  <p:stCondLst>
+                                    <p:cond delay="0"/>
+                                  </p:stCondLst>
+                                  <p:childTnLst>
+                                    <p:set>
+                                      <p:cBhvr>
+                                        <p:cTn id="6" dur="1" fill="hold">
+                                          <p:stCondLst>
+                                            <p:cond delay="0"/>
+                                          </p:stCondLst>
+                                        </p:cTn>
+                                        <p:tgtEl>
+                                          <p:spTgt spid="3">
+                                            <p:txEl>
+                                              <p:pRg st="0" end="0"/>
+                                            </p:txEl>
+                                          </p:spTgt>
+                                        </p:tgtEl>
+                                        <p:attrNameLst>
+                                          <p:attrName>style.visibility</p:attrName>
+                                        </p:attrNameLst>
+                                      </p:cBhvr>
+                                      <p:to>
+                                        <p:strVal val="visible"/>
+                                      </p:to>
+                                    </p:set>
+                                    <p:animEffect transition="in" filter="fade">
+                                      <p:cBhvr>
+                                        <p:cTn id="7" dur="500"/>
+                                        <p:tgtEl>
+                                          <p:spTgt spid="3">
+                                            <p:txEl>
+                                              <p:pRg st="0" end="0"/>
+                                            </p:txEl>
+                                          </p:spTgt>
+                                        </p:tgtEl>
+                                      </p:cBhvr>
+                                    </p:animEffect>
+                                  </p:childTnLst>
+                                </p:cTn>
+                              </p:par>
+                            </p:childTnLst>
+                          </p:cTn>
+                        </p:par>
+                      </p:childTnLst>
+                    </p:cTn>
+                  </p:par>
+                  <p:par>
+                    <p:cTn id="8" fill="hold">
+                      <p:stCondLst>
+                        <p:cond delay="indefinite"/>
+                      </p:stCondLst>
+                      <p:childTnLst>
+                        <p:par>
+                          <p:cTn id="9" fill="hold">
+                            <p:stCondLst>
+                              <p:cond delay="0"/>
+                            </p:stCondLst>
+                            <p:childTnLst>
+                              <p:par>
+                                <p:cTn id="10" presetID="10" presetClass="entr" presetSubtype="0" fill="hold" nodeType="clickEffect">
+                                  <p:stCondLst>
+                                    <p:cond delay="0"/>
+                                  </p:stCondLst>
+                                  <p:childTnLst>
+                                    <p:set>
+                                      <p:cBhvr>
+                                        <p:cTn id="11" dur="1" fill="hold">
+                                          <p:stCondLst>
+                                            <p:cond delay="0"/>
+                                          </p:stCondLst>
+                                        </p:cTn>
+                                        <p:tgtEl>
+                                          <p:spTgt spid="3">
+                                            <p:txEl>
+                                              <p:pRg st="1" end="1"/>
+                                            </p:txEl>
+                                          </p:spTgt>
+                                        </p:tgtEl>
+                                        <p:attrNameLst>
+                                          <p:attrName>style.visibility</p:attrName>
+                                        </p:attrNameLst>
+                                      </p:cBhvr>
+                                      <p:to>
+                                        <p:strVal val="visible"/>
+                                      </p:to>
+                                    </p:set>
+                                    <p:animEffect transition="in" filter="fade">
+                                      <p:cBhvr>
+                                        <p:cTn id="12" dur="500"/>
+                                        <p:tgtEl>
+                                          <p:spTgt spid="3">
+                                            <p:txEl>
+                                              <p:pRg st="1" end="1"/>
+                                            </p:txEl>
+                                          </p:spTgt>
+                                        </p:tgtEl>
+                                      </p:cBhvr>
+                                    </p:animEffect>
+                                  </p:childTnLst>
+                                </p:cTn>
+                              </p:par>
+                            </p:childTnLst>
+                          </p:cTn>
+                        </p:par>
+                      </p:childTnLst>
+                    </p:cTn>
+                  </p:par>
+                  <p:par>
+                    <p:cTn id="13" fill="hold">
+                      <p:stCondLst>
+                        <p:cond delay="indefinite"/>
+                      </p:stCondLst>
+                      <p:childTnLst>
+                        <p:par>
+                          <p:cTn id="14" fill="hold">
+                            <p:stCondLst>
+                              <p:cond delay="0"/>
+                            </p:stCondLst>
+                            <p:childTnLst>
+                              <p:par>
+                                <p:cTn id="15" presetID="10" presetClass="entr" presetSubtype="0" fill="hold" nodeType="clickEffect">
+                                  <p:stCondLst>
+                                    <p:cond delay="0"/>
+                                  </p:stCondLst>
+                                  <p:childTnLst>
+                                    <p:set>
+                                      <p:cBhvr>
+                                        <p:cTn id="16" dur="1" fill="hold">
+                                          <p:stCondLst>
+                                            <p:cond delay="0"/>
+                                          </p:stCondLst>
+                                        </p:cTn>
+                                        <p:tgtEl>
+                                          <p:spTgt spid="5"/>
+                                        </p:tgtEl>
+                                        <p:attrNameLst>
+                                          <p:attrName>style.visibility</p:attrName>
+                                        </p:attrNameLst>
+                                      </p:cBhvr>
+                                      <p:to>
+                                        <p:strVal val="visible"/>
+                                      </p:to>
+                                    </p:set>
+                                    <p:animEffect transition="in" filter="fade">
+                                      <p:cBhvr>
+                                        <p:cTn id="17" dur="500"/>
+                                        <p:tgtEl>
+                                          <p:spTgt spid="5"/>
+                                        </p:tgtEl>
+                                      </p:cBhvr>
+                                    </p:animEffect>
+                                  </p:childTnLst>
+                                </p:cTn>
+                              </p:par>
+                            </p:childTnLst>
+                          </p:cTn>
+                        </p:par>
+                      </p:childTnLst>
+                    </p:cTn>
+                  </p:par>
+                  <p:par>
+                    <p:cTn id="18" fill="hold">
+                      <p:stCondLst>
+                        <p:cond delay="indefinite"/>
+                      </p:stCondLst>
+                      <p:childTnLst>
+                        <p:par>
+                          <p:cTn id="19" fill="hold">
+                            <p:stCondLst>
+                              <p:cond delay="0"/>
+                            </p:stCondLst>
+                            <p:childTnLst>
+                              <p:par>
+                                <p:cTn id="20" presetID="10" presetClass="entr" presetSubtype="0" fill="hold" nodeType="clickEffect">
+                                  <p:stCondLst>
+                                    <p:cond delay="0"/>
+                                  </p:stCondLst>
+                                  <p:childTnLst>
+                                    <p:set>
+                                      <p:cBhvr>
+                                        <p:cTn id="21" dur="1" fill="hold">
+                                          <p:stCondLst>
+                                            <p:cond delay="0"/>
+                                          </p:stCondLst>
+                                        </p:cTn>
+                                        <p:tgtEl>
+                                          <p:spTgt spid="9">
+                                            <p:txEl>
+                                              <p:pRg st="0" end="0"/>
+                                            </p:txEl>
+                                          </p:spTgt>
+                                        </p:tgtEl>
+                                        <p:attrNameLst>
+                                          <p:attrName>style.visibility</p:attrName>
+                                        </p:attrNameLst>
+                                      </p:cBhvr>
+                                      <p:to>
+                                        <p:strVal val="visible"/>
+                                      </p:to>
+                                    </p:set>
+                                    <p:animEffect transition="in" filter="fade">
+                                      <p:cBhvr>
+                                        <p:cTn id="22" dur="500"/>
+                                        <p:tgtEl>
+                                          <p:spTgt spid="9">
+                                            <p:txEl>
+                                              <p:pRg st="0" end="0"/>
+                                            </p:txEl>
+                                          </p:spTgt>
+                                        </p:tgtEl>
+                                      </p:cBhvr>
+                                    </p:animEffect>
+                                  </p:childTnLst>
+                                </p:cTn>
+                              </p:par>
+                            </p:childTnLst>
+                          </p:cTn>
+                        </p:par>
+                      </p:childTnLst>
+                    </p:cTn>
+                  </p:par>
+                </p:childTnLst>
+              </p:cTn>
+              <p:prevCondLst>
+                <p:cond evt="onPrev" delay="0">
+                  <p:tgtEl>
+                    <p:sldTgt/>
+                  </p:tgtEl>
+                </p:cond>
+              </p:prevCondLst>
+              <p:nextCondLst>
+                <p:cond evt="onNext" delay="0">
+                  <p:tgtEl>
+                    <p:sldTgt/>
+                  </p:tgtEl>
+                </p:cond>
+              </p:nextCondLst>
+            </p:seq>
+          </p:childTnLst>
+        </p:cTn>
+      </p:par>
+    </p:tnLst>
+  </p:timing>
+</p:sld>
+</file>
+
+<file path=ppt/slides/slide5.xml><?xml version="1.0" encoding="utf-8"?>
+<p:sld xmlns:a="http://schemas.openxmlformats.org/drawingml/2006/main" xmlns:r="http://schemas.openxmlformats.org/officeDocument/2006/relationships" xmlns:p="http://schemas.openxmlformats.org/presentationml/2006/main">
+  <p:cSld>
+    <p:spTree>
+      <p:nvGrpSpPr>
+        <p:cNvPr id="1" name=""/>
+        <p:cNvGrpSpPr/>
+        <p:nvPr/>
+      </p:nvGrpSpPr>
+      <p:grpSpPr>
+        <a:xfrm>
+          <a:off x="0" y="0"/>
+          <a:ext cx="0" cy="0"/>
+          <a:chOff x="0" y="0"/>
+          <a:chExt cx="0" cy="0"/>
+        </a:xfrm>
+      </p:grpSpPr>
+      <p:sp>
+        <p:nvSpPr>
+          <p:cNvPr id="2" name="Title 1">
             <a:extLst>
               <a:ext uri="{FF2B5EF4-FFF2-40B4-BE49-F238E27FC236}">
-                <a16:creationId xmlns:a16="http://schemas.microsoft.com/office/drawing/2014/main" id="{07358ED4-ABAA-4E7A-BB26-E3C2AE4A9313}"/>
+                <a16:creationId xmlns:a16="http://schemas.microsoft.com/office/drawing/2014/main" id="{7AD744B1-9B67-44B7-98E7-34329A0B7052}"/>
+              </a:ext>
+            </a:extLst>
+          </p:cNvPr>
+          <p:cNvSpPr>
+            <a:spLocks noGrp="1"/>
+          </p:cNvSpPr>
+          <p:nvPr>
+            <p:ph type="title"/>
+          </p:nvPr>
+        </p:nvSpPr>
+        <p:spPr/>
+        <p:txBody>
+          <a:bodyPr>
+            <a:normAutofit/>
+          </a:bodyPr>
+          <a:lstStyle/>
+          <a:p>
+            <a:r>
+              <a:rPr lang="en-GB" sz="4000" dirty="0">
+                <a:latin typeface="+mn-lt"/>
+              </a:rPr>
+              <a:t>What is a CNN</a:t>
+            </a:r>
+          </a:p>
+        </p:txBody>
+      </p:sp>
+      <p:sp>
+        <p:nvSpPr>
+          <p:cNvPr id="3" name="Content Placeholder 2">
+            <a:extLst>
+              <a:ext uri="{FF2B5EF4-FFF2-40B4-BE49-F238E27FC236}">
+                <a16:creationId xmlns:a16="http://schemas.microsoft.com/office/drawing/2014/main" id="{BB256B89-CA49-438C-BD20-768590EBF0F2}"/>
+              </a:ext>
+            </a:extLst>
+          </p:cNvPr>
+          <p:cNvSpPr>
+            <a:spLocks noGrp="1"/>
+          </p:cNvSpPr>
+          <p:nvPr>
+            <p:ph idx="1"/>
+          </p:nvPr>
+        </p:nvSpPr>
+        <p:spPr>
+          <a:xfrm>
+            <a:off x="913795" y="1640681"/>
+            <a:ext cx="10353762" cy="452438"/>
+          </a:xfrm>
+        </p:spPr>
+        <p:txBody>
+          <a:bodyPr>
+            <a:noAutofit/>
+          </a:bodyPr>
+          <a:lstStyle/>
+          <a:p>
+            <a:r>
+              <a:rPr lang="en-GB" sz="2400" dirty="0"/>
+              <a:t>Max pooling follows Convolution. Reduce dimensionality of response map</a:t>
+            </a:r>
+          </a:p>
+        </p:txBody>
+      </p:sp>
+      <p:pic>
+        <p:nvPicPr>
+          <p:cNvPr id="3074" name="Picture 2" descr="Image result for max pooling">
+            <a:extLst>
+              <a:ext uri="{FF2B5EF4-FFF2-40B4-BE49-F238E27FC236}">
+                <a16:creationId xmlns:a16="http://schemas.microsoft.com/office/drawing/2014/main" id="{DB801CED-BAFB-4E24-ABAE-14CED2C778F5}"/>
+              </a:ext>
+            </a:extLst>
+          </p:cNvPr>
+          <p:cNvPicPr>
+            <a:picLocks noChangeAspect="1" noChangeArrowheads="1"/>
+          </p:cNvPicPr>
+          <p:nvPr/>
+        </p:nvPicPr>
+        <p:blipFill>
+          <a:blip r:embed="rId2">
+            <a:extLst>
+              <a:ext uri="{28A0092B-C50C-407E-A947-70E740481C1C}">
+                <a14:useLocalDpi xmlns:a14="http://schemas.microsoft.com/office/drawing/2010/main" val="0"/>
+              </a:ext>
+            </a:extLst>
+          </a:blip>
+          <a:srcRect/>
+          <a:stretch>
+            <a:fillRect/>
+          </a:stretch>
+        </p:blipFill>
+        <p:spPr bwMode="auto">
+          <a:xfrm>
+            <a:off x="4519927" y="2240233"/>
+            <a:ext cx="3152146" cy="1315495"/>
+          </a:xfrm>
+          <a:prstGeom prst="rect">
+            <a:avLst/>
+          </a:prstGeom>
+          <a:noFill/>
+          <a:extLst>
+            <a:ext uri="{909E8E84-426E-40DD-AFC4-6F175D3DCCD1}">
+              <a14:hiddenFill xmlns:a14="http://schemas.microsoft.com/office/drawing/2010/main">
+                <a:solidFill>
+                  <a:srgbClr val="FFFFFF"/>
+                </a:solidFill>
+              </a14:hiddenFill>
+            </a:ext>
+          </a:extLst>
+        </p:spPr>
+      </p:pic>
+      <p:sp>
+        <p:nvSpPr>
+          <p:cNvPr id="6" name="Content Placeholder 2">
+            <a:extLst>
+              <a:ext uri="{FF2B5EF4-FFF2-40B4-BE49-F238E27FC236}">
+                <a16:creationId xmlns:a16="http://schemas.microsoft.com/office/drawing/2014/main" id="{D8B437D0-705B-421E-855B-1FFF1102C2A4}"/>
               </a:ext>
             </a:extLst>
           </p:cNvPr>
@@ -8755,8 +9415,8 @@
         </p:nvSpPr>
         <p:spPr>
           <a:xfrm>
-            <a:off x="913795" y="5455584"/>
-            <a:ext cx="10353762" cy="1402416"/>
+            <a:off x="913795" y="3679031"/>
+            <a:ext cx="10353762" cy="3036094"/>
           </a:xfrm>
           <a:prstGeom prst="rect">
             <a:avLst/>
@@ -9122,835 +9782,39 @@
           </a:lstStyle>
           <a:p>
             <a:r>
-              <a:rPr lang="en-GB" dirty="0"/>
-              <a:t>Common to have multiple filters to produce multiple response maps for each input. For example 64x64x3 RBG image -&gt; 60x60x32 using 32 4x4x3 filters cross-channel sum with no padding</a:t>
-            </a:r>
-          </a:p>
-          <a:p>
-            <a:endParaRPr lang="en-GB" dirty="0"/>
-          </a:p>
-        </p:txBody>
-      </p:sp>
-    </p:spTree>
-    <p:extLst>
-      <p:ext uri="{BB962C8B-B14F-4D97-AF65-F5344CB8AC3E}">
-        <p14:creationId xmlns:p14="http://schemas.microsoft.com/office/powerpoint/2010/main" val="2044857651"/>
-      </p:ext>
-    </p:extLst>
-  </p:cSld>
-  <p:clrMapOvr>
-    <a:masterClrMapping/>
-  </p:clrMapOvr>
-  <p:timing>
-    <p:tnLst>
-      <p:par>
-        <p:cTn id="1" dur="indefinite" restart="never" nodeType="tmRoot">
-          <p:childTnLst>
-            <p:seq concurrent="1" nextAc="seek">
-              <p:cTn id="2" dur="indefinite" nodeType="mainSeq">
-                <p:childTnLst>
-                  <p:par>
-                    <p:cTn id="3" fill="hold">
-                      <p:stCondLst>
-                        <p:cond delay="indefinite"/>
-                      </p:stCondLst>
-                      <p:childTnLst>
-                        <p:par>
-                          <p:cTn id="4" fill="hold">
-                            <p:stCondLst>
-                              <p:cond delay="0"/>
-                            </p:stCondLst>
-                            <p:childTnLst>
-                              <p:par>
-                                <p:cTn id="5" presetID="10" presetClass="entr" presetSubtype="0" fill="hold" nodeType="clickEffect">
-                                  <p:stCondLst>
-                                    <p:cond delay="0"/>
-                                  </p:stCondLst>
-                                  <p:childTnLst>
-                                    <p:set>
-                                      <p:cBhvr>
-                                        <p:cTn id="6" dur="1" fill="hold">
-                                          <p:stCondLst>
-                                            <p:cond delay="0"/>
-                                          </p:stCondLst>
-                                        </p:cTn>
-                                        <p:tgtEl>
-                                          <p:spTgt spid="3">
-                                            <p:txEl>
-                                              <p:pRg st="0" end="0"/>
-                                            </p:txEl>
-                                          </p:spTgt>
-                                        </p:tgtEl>
-                                        <p:attrNameLst>
-                                          <p:attrName>style.visibility</p:attrName>
-                                        </p:attrNameLst>
-                                      </p:cBhvr>
-                                      <p:to>
-                                        <p:strVal val="visible"/>
-                                      </p:to>
-                                    </p:set>
-                                    <p:animEffect transition="in" filter="fade">
-                                      <p:cBhvr>
-                                        <p:cTn id="7" dur="500"/>
-                                        <p:tgtEl>
-                                          <p:spTgt spid="3">
-                                            <p:txEl>
-                                              <p:pRg st="0" end="0"/>
-                                            </p:txEl>
-                                          </p:spTgt>
-                                        </p:tgtEl>
-                                      </p:cBhvr>
-                                    </p:animEffect>
-                                  </p:childTnLst>
-                                </p:cTn>
-                              </p:par>
-                            </p:childTnLst>
-                          </p:cTn>
-                        </p:par>
-                      </p:childTnLst>
-                    </p:cTn>
-                  </p:par>
-                  <p:par>
-                    <p:cTn id="8" fill="hold">
-                      <p:stCondLst>
-                        <p:cond delay="indefinite"/>
-                      </p:stCondLst>
-                      <p:childTnLst>
-                        <p:par>
-                          <p:cTn id="9" fill="hold">
-                            <p:stCondLst>
-                              <p:cond delay="0"/>
-                            </p:stCondLst>
-                            <p:childTnLst>
-                              <p:par>
-                                <p:cTn id="10" presetID="10" presetClass="entr" presetSubtype="0" fill="hold" nodeType="clickEffect">
-                                  <p:stCondLst>
-                                    <p:cond delay="0"/>
-                                  </p:stCondLst>
-                                  <p:childTnLst>
-                                    <p:set>
-                                      <p:cBhvr>
-                                        <p:cTn id="11" dur="1" fill="hold">
-                                          <p:stCondLst>
-                                            <p:cond delay="0"/>
-                                          </p:stCondLst>
-                                        </p:cTn>
-                                        <p:tgtEl>
-                                          <p:spTgt spid="3">
-                                            <p:txEl>
-                                              <p:pRg st="1" end="1"/>
-                                            </p:txEl>
-                                          </p:spTgt>
-                                        </p:tgtEl>
-                                        <p:attrNameLst>
-                                          <p:attrName>style.visibility</p:attrName>
-                                        </p:attrNameLst>
-                                      </p:cBhvr>
-                                      <p:to>
-                                        <p:strVal val="visible"/>
-                                      </p:to>
-                                    </p:set>
-                                    <p:animEffect transition="in" filter="fade">
-                                      <p:cBhvr>
-                                        <p:cTn id="12" dur="500"/>
-                                        <p:tgtEl>
-                                          <p:spTgt spid="3">
-                                            <p:txEl>
-                                              <p:pRg st="1" end="1"/>
-                                            </p:txEl>
-                                          </p:spTgt>
-                                        </p:tgtEl>
-                                      </p:cBhvr>
-                                    </p:animEffect>
-                                  </p:childTnLst>
-                                </p:cTn>
-                              </p:par>
-                            </p:childTnLst>
-                          </p:cTn>
-                        </p:par>
-                      </p:childTnLst>
-                    </p:cTn>
-                  </p:par>
-                  <p:par>
-                    <p:cTn id="13" fill="hold">
-                      <p:stCondLst>
-                        <p:cond delay="indefinite"/>
-                      </p:stCondLst>
-                      <p:childTnLst>
-                        <p:par>
-                          <p:cTn id="14" fill="hold">
-                            <p:stCondLst>
-                              <p:cond delay="0"/>
-                            </p:stCondLst>
-                            <p:childTnLst>
-                              <p:par>
-                                <p:cTn id="15" presetID="10" presetClass="entr" presetSubtype="0" fill="hold" nodeType="clickEffect">
-                                  <p:stCondLst>
-                                    <p:cond delay="0"/>
-                                  </p:stCondLst>
-                                  <p:childTnLst>
-                                    <p:set>
-                                      <p:cBhvr>
-                                        <p:cTn id="16" dur="1" fill="hold">
-                                          <p:stCondLst>
-                                            <p:cond delay="0"/>
-                                          </p:stCondLst>
-                                        </p:cTn>
-                                        <p:tgtEl>
-                                          <p:spTgt spid="5"/>
-                                        </p:tgtEl>
-                                        <p:attrNameLst>
-                                          <p:attrName>style.visibility</p:attrName>
-                                        </p:attrNameLst>
-                                      </p:cBhvr>
-                                      <p:to>
-                                        <p:strVal val="visible"/>
-                                      </p:to>
-                                    </p:set>
-                                    <p:animEffect transition="in" filter="fade">
-                                      <p:cBhvr>
-                                        <p:cTn id="17" dur="500"/>
-                                        <p:tgtEl>
-                                          <p:spTgt spid="5"/>
-                                        </p:tgtEl>
-                                      </p:cBhvr>
-                                    </p:animEffect>
-                                  </p:childTnLst>
-                                </p:cTn>
-                              </p:par>
-                            </p:childTnLst>
-                          </p:cTn>
-                        </p:par>
-                      </p:childTnLst>
-                    </p:cTn>
-                  </p:par>
-                  <p:par>
-                    <p:cTn id="18" fill="hold">
-                      <p:stCondLst>
-                        <p:cond delay="indefinite"/>
-                      </p:stCondLst>
-                      <p:childTnLst>
-                        <p:par>
-                          <p:cTn id="19" fill="hold">
-                            <p:stCondLst>
-                              <p:cond delay="0"/>
-                            </p:stCondLst>
-                            <p:childTnLst>
-                              <p:par>
-                                <p:cTn id="20" presetID="10" presetClass="entr" presetSubtype="0" fill="hold" nodeType="clickEffect">
-                                  <p:stCondLst>
-                                    <p:cond delay="0"/>
-                                  </p:stCondLst>
-                                  <p:childTnLst>
-                                    <p:set>
-                                      <p:cBhvr>
-                                        <p:cTn id="21" dur="1" fill="hold">
-                                          <p:stCondLst>
-                                            <p:cond delay="0"/>
-                                          </p:stCondLst>
-                                        </p:cTn>
-                                        <p:tgtEl>
-                                          <p:spTgt spid="9">
-                                            <p:txEl>
-                                              <p:pRg st="0" end="0"/>
-                                            </p:txEl>
-                                          </p:spTgt>
-                                        </p:tgtEl>
-                                        <p:attrNameLst>
-                                          <p:attrName>style.visibility</p:attrName>
-                                        </p:attrNameLst>
-                                      </p:cBhvr>
-                                      <p:to>
-                                        <p:strVal val="visible"/>
-                                      </p:to>
-                                    </p:set>
-                                    <p:animEffect transition="in" filter="fade">
-                                      <p:cBhvr>
-                                        <p:cTn id="22" dur="500"/>
-                                        <p:tgtEl>
-                                          <p:spTgt spid="9">
-                                            <p:txEl>
-                                              <p:pRg st="0" end="0"/>
-                                            </p:txEl>
-                                          </p:spTgt>
-                                        </p:tgtEl>
-                                      </p:cBhvr>
-                                    </p:animEffect>
-                                  </p:childTnLst>
-                                </p:cTn>
-                              </p:par>
-                            </p:childTnLst>
-                          </p:cTn>
-                        </p:par>
-                      </p:childTnLst>
-                    </p:cTn>
-                  </p:par>
-                </p:childTnLst>
-              </p:cTn>
-              <p:prevCondLst>
-                <p:cond evt="onPrev" delay="0">
-                  <p:tgtEl>
-                    <p:sldTgt/>
-                  </p:tgtEl>
-                </p:cond>
-              </p:prevCondLst>
-              <p:nextCondLst>
-                <p:cond evt="onNext" delay="0">
-                  <p:tgtEl>
-                    <p:sldTgt/>
-                  </p:tgtEl>
-                </p:cond>
-              </p:nextCondLst>
-            </p:seq>
-          </p:childTnLst>
-        </p:cTn>
-      </p:par>
-    </p:tnLst>
-  </p:timing>
-</p:sld>
-</file>
-
-<file path=ppt/slides/slide5.xml><?xml version="1.0" encoding="utf-8"?>
-<p:sld xmlns:a="http://schemas.openxmlformats.org/drawingml/2006/main" xmlns:r="http://schemas.openxmlformats.org/officeDocument/2006/relationships" xmlns:p="http://schemas.openxmlformats.org/presentationml/2006/main">
-  <p:cSld>
-    <p:spTree>
-      <p:nvGrpSpPr>
-        <p:cNvPr id="1" name=""/>
-        <p:cNvGrpSpPr/>
-        <p:nvPr/>
-      </p:nvGrpSpPr>
-      <p:grpSpPr>
-        <a:xfrm>
-          <a:off x="0" y="0"/>
-          <a:ext cx="0" cy="0"/>
-          <a:chOff x="0" y="0"/>
-          <a:chExt cx="0" cy="0"/>
-        </a:xfrm>
-      </p:grpSpPr>
-      <p:sp>
-        <p:nvSpPr>
-          <p:cNvPr id="2" name="Title 1">
-            <a:extLst>
-              <a:ext uri="{FF2B5EF4-FFF2-40B4-BE49-F238E27FC236}">
-                <a16:creationId xmlns:a16="http://schemas.microsoft.com/office/drawing/2014/main" id="{7AD744B1-9B67-44B7-98E7-34329A0B7052}"/>
-              </a:ext>
-            </a:extLst>
-          </p:cNvPr>
-          <p:cNvSpPr>
-            <a:spLocks noGrp="1"/>
-          </p:cNvSpPr>
-          <p:nvPr>
-            <p:ph type="title"/>
-          </p:nvPr>
-        </p:nvSpPr>
-        <p:spPr/>
-        <p:txBody>
-          <a:bodyPr/>
-          <a:lstStyle/>
-          <a:p>
-            <a:r>
-              <a:rPr lang="en-GB" dirty="0"/>
-              <a:t>What is a CNN</a:t>
-            </a:r>
-          </a:p>
-        </p:txBody>
-      </p:sp>
-      <p:sp>
-        <p:nvSpPr>
-          <p:cNvPr id="3" name="Content Placeholder 2">
-            <a:extLst>
-              <a:ext uri="{FF2B5EF4-FFF2-40B4-BE49-F238E27FC236}">
-                <a16:creationId xmlns:a16="http://schemas.microsoft.com/office/drawing/2014/main" id="{BB256B89-CA49-438C-BD20-768590EBF0F2}"/>
-              </a:ext>
-            </a:extLst>
-          </p:cNvPr>
-          <p:cNvSpPr>
-            <a:spLocks noGrp="1"/>
-          </p:cNvSpPr>
-          <p:nvPr>
-            <p:ph idx="1"/>
-          </p:nvPr>
-        </p:nvSpPr>
-        <p:spPr>
-          <a:xfrm>
-            <a:off x="913795" y="1640681"/>
-            <a:ext cx="10353762" cy="452438"/>
-          </a:xfrm>
-        </p:spPr>
-        <p:txBody>
-          <a:bodyPr/>
-          <a:lstStyle/>
-          <a:p>
-            <a:r>
-              <a:rPr lang="en-GB" dirty="0"/>
-              <a:t>Max pooling follows Convolution. Takes every response map and reduce it’s dimensionality</a:t>
-            </a:r>
-          </a:p>
-        </p:txBody>
-      </p:sp>
-      <p:pic>
-        <p:nvPicPr>
-          <p:cNvPr id="3074" name="Picture 2" descr="Image result for max pooling">
-            <a:extLst>
-              <a:ext uri="{FF2B5EF4-FFF2-40B4-BE49-F238E27FC236}">
-                <a16:creationId xmlns:a16="http://schemas.microsoft.com/office/drawing/2014/main" id="{DB801CED-BAFB-4E24-ABAE-14CED2C778F5}"/>
-              </a:ext>
-            </a:extLst>
-          </p:cNvPr>
-          <p:cNvPicPr>
-            <a:picLocks noChangeAspect="1" noChangeArrowheads="1"/>
-          </p:cNvPicPr>
-          <p:nvPr/>
-        </p:nvPicPr>
-        <p:blipFill>
-          <a:blip r:embed="rId2">
-            <a:extLst>
-              <a:ext uri="{28A0092B-C50C-407E-A947-70E740481C1C}">
-                <a14:useLocalDpi xmlns:a14="http://schemas.microsoft.com/office/drawing/2010/main" val="0"/>
-              </a:ext>
-            </a:extLst>
-          </a:blip>
-          <a:srcRect/>
-          <a:stretch>
-            <a:fillRect/>
-          </a:stretch>
-        </p:blipFill>
-        <p:spPr bwMode="auto">
-          <a:xfrm>
-            <a:off x="3741573" y="2076450"/>
-            <a:ext cx="4698206" cy="1960718"/>
-          </a:xfrm>
-          <a:prstGeom prst="rect">
-            <a:avLst/>
-          </a:prstGeom>
-          <a:noFill/>
-          <a:extLst>
-            <a:ext uri="{909E8E84-426E-40DD-AFC4-6F175D3DCCD1}">
-              <a14:hiddenFill xmlns:a14="http://schemas.microsoft.com/office/drawing/2010/main">
-                <a:solidFill>
-                  <a:srgbClr val="FFFFFF"/>
-                </a:solidFill>
-              </a14:hiddenFill>
-            </a:ext>
-          </a:extLst>
-        </p:spPr>
-      </p:pic>
-      <p:sp>
-        <p:nvSpPr>
-          <p:cNvPr id="6" name="Content Placeholder 2">
-            <a:extLst>
-              <a:ext uri="{FF2B5EF4-FFF2-40B4-BE49-F238E27FC236}">
-                <a16:creationId xmlns:a16="http://schemas.microsoft.com/office/drawing/2014/main" id="{D8B437D0-705B-421E-855B-1FFF1102C2A4}"/>
-              </a:ext>
-            </a:extLst>
-          </p:cNvPr>
-          <p:cNvSpPr txBox="1">
-            <a:spLocks/>
-          </p:cNvSpPr>
-          <p:nvPr/>
-        </p:nvSpPr>
-        <p:spPr>
-          <a:xfrm>
-            <a:off x="913795" y="4240523"/>
-            <a:ext cx="10353762" cy="2474602"/>
-          </a:xfrm>
-          <a:prstGeom prst="rect">
-            <a:avLst/>
-          </a:prstGeom>
-          <a:effectLst>
-            <a:outerShdw blurRad="25400" dir="17880000">
-              <a:srgbClr val="000000">
-                <a:alpha val="46000"/>
-              </a:srgbClr>
-            </a:outerShdw>
-          </a:effectLst>
-        </p:spPr>
-        <p:txBody>
-          <a:bodyPr vert="horz" lIns="91440" tIns="45720" rIns="91440" bIns="45720" rtlCol="0" anchor="t">
-            <a:normAutofit lnSpcReduction="10000"/>
-          </a:bodyPr>
-          <a:lstStyle>
-            <a:lvl1pPr marL="342900" indent="-306000" algn="l" defTabSz="457200" rtl="0" eaLnBrk="1" latinLnBrk="0" hangingPunct="1">
-              <a:lnSpc>
-                <a:spcPct val="110000"/>
-              </a:lnSpc>
-              <a:spcBef>
-                <a:spcPct val="20000"/>
-              </a:spcBef>
-              <a:spcAft>
-                <a:spcPts val="600"/>
-              </a:spcAft>
-              <a:buClr>
-                <a:schemeClr val="tx2"/>
-              </a:buClr>
-              <a:buSzPct val="70000"/>
-              <a:buFont typeface="Wingdings 2" charset="2"/>
-              <a:buChar char=""/>
-              <a:defRPr sz="2100" kern="1200">
-                <a:ln>
-                  <a:solidFill>
-                    <a:schemeClr val="bg1">
-                      <a:lumMod val="75000"/>
-                      <a:lumOff val="25000"/>
-                      <a:alpha val="10000"/>
-                    </a:schemeClr>
-                  </a:solidFill>
-                </a:ln>
-                <a:solidFill>
-                  <a:schemeClr val="tx2"/>
-                </a:solidFill>
-                <a:effectLst>
-                  <a:outerShdw blurRad="9525" dist="25400" dir="14640000" algn="tl" rotWithShape="0">
-                    <a:schemeClr val="bg1">
-                      <a:alpha val="30000"/>
-                    </a:schemeClr>
-                  </a:outerShdw>
-                </a:effectLst>
-                <a:latin typeface="+mn-lt"/>
-                <a:ea typeface="+mn-ea"/>
-                <a:cs typeface="+mn-cs"/>
-              </a:defRPr>
-            </a:lvl1pPr>
-            <a:lvl2pPr marL="720000" indent="-270000" algn="l" defTabSz="457200" rtl="0" eaLnBrk="1" latinLnBrk="0" hangingPunct="1">
-              <a:spcBef>
-                <a:spcPct val="20000"/>
-              </a:spcBef>
-              <a:spcAft>
-                <a:spcPts val="600"/>
-              </a:spcAft>
-              <a:buClr>
-                <a:schemeClr val="tx2"/>
-              </a:buClr>
-              <a:buSzPct val="70000"/>
-              <a:buFont typeface="Wingdings 2" charset="2"/>
-              <a:buChar char=""/>
-              <a:defRPr sz="1900" kern="1200">
-                <a:ln>
-                  <a:solidFill>
-                    <a:schemeClr val="bg1">
-                      <a:lumMod val="75000"/>
-                      <a:lumOff val="25000"/>
-                      <a:alpha val="10000"/>
-                    </a:schemeClr>
-                  </a:solidFill>
-                </a:ln>
-                <a:solidFill>
-                  <a:schemeClr val="tx2"/>
-                </a:solidFill>
-                <a:effectLst>
-                  <a:outerShdw blurRad="9525" dist="25400" dir="14640000" algn="tl" rotWithShape="0">
-                    <a:schemeClr val="bg1">
-                      <a:alpha val="30000"/>
-                    </a:schemeClr>
-                  </a:outerShdw>
-                </a:effectLst>
-                <a:latin typeface="+mn-lt"/>
-                <a:ea typeface="+mn-ea"/>
-                <a:cs typeface="+mn-cs"/>
-              </a:defRPr>
-            </a:lvl2pPr>
-            <a:lvl3pPr marL="1026000" indent="-216000" algn="l" defTabSz="457200" rtl="0" eaLnBrk="1" latinLnBrk="0" hangingPunct="1">
-              <a:spcBef>
-                <a:spcPct val="20000"/>
-              </a:spcBef>
-              <a:spcAft>
-                <a:spcPts val="600"/>
-              </a:spcAft>
-              <a:buClr>
-                <a:schemeClr val="tx2"/>
-              </a:buClr>
-              <a:buSzPct val="70000"/>
-              <a:buFont typeface="Wingdings 2" charset="2"/>
-              <a:buChar char=""/>
-              <a:defRPr sz="1700" kern="1200">
-                <a:ln>
-                  <a:solidFill>
-                    <a:schemeClr val="bg1">
-                      <a:lumMod val="75000"/>
-                      <a:lumOff val="25000"/>
-                      <a:alpha val="10000"/>
-                    </a:schemeClr>
-                  </a:solidFill>
-                </a:ln>
-                <a:solidFill>
-                  <a:schemeClr val="tx2"/>
-                </a:solidFill>
-                <a:effectLst>
-                  <a:outerShdw blurRad="9525" dist="25400" dir="14640000" algn="tl" rotWithShape="0">
-                    <a:schemeClr val="bg1">
-                      <a:alpha val="30000"/>
-                    </a:schemeClr>
-                  </a:outerShdw>
-                </a:effectLst>
-                <a:latin typeface="+mn-lt"/>
-                <a:ea typeface="+mn-ea"/>
-                <a:cs typeface="+mn-cs"/>
-              </a:defRPr>
-            </a:lvl3pPr>
-            <a:lvl4pPr marL="1386000" indent="-216000" algn="l" defTabSz="457200" rtl="0" eaLnBrk="1" latinLnBrk="0" hangingPunct="1">
-              <a:spcBef>
-                <a:spcPct val="20000"/>
-              </a:spcBef>
-              <a:spcAft>
-                <a:spcPts val="600"/>
-              </a:spcAft>
-              <a:buClr>
-                <a:schemeClr val="tx2"/>
-              </a:buClr>
-              <a:buSzPct val="70000"/>
-              <a:buFont typeface="Wingdings 2" charset="2"/>
-              <a:buChar char=""/>
-              <a:defRPr sz="1500" kern="1200">
-                <a:ln>
-                  <a:solidFill>
-                    <a:schemeClr val="bg1">
-                      <a:lumMod val="75000"/>
-                      <a:lumOff val="25000"/>
-                      <a:alpha val="10000"/>
-                    </a:schemeClr>
-                  </a:solidFill>
-                </a:ln>
-                <a:solidFill>
-                  <a:schemeClr val="tx2"/>
-                </a:solidFill>
-                <a:effectLst>
-                  <a:outerShdw blurRad="9525" dist="25400" dir="14640000" algn="tl" rotWithShape="0">
-                    <a:schemeClr val="bg1">
-                      <a:alpha val="30000"/>
-                    </a:schemeClr>
-                  </a:outerShdw>
-                </a:effectLst>
-                <a:latin typeface="+mn-lt"/>
-                <a:ea typeface="+mn-ea"/>
-                <a:cs typeface="+mn-cs"/>
-              </a:defRPr>
-            </a:lvl4pPr>
-            <a:lvl5pPr marL="1674000" indent="-216000" algn="l" defTabSz="457200" rtl="0" eaLnBrk="1" latinLnBrk="0" hangingPunct="1">
-              <a:spcBef>
-                <a:spcPct val="20000"/>
-              </a:spcBef>
-              <a:spcAft>
-                <a:spcPts val="600"/>
-              </a:spcAft>
-              <a:buClr>
-                <a:schemeClr val="tx2"/>
-              </a:buClr>
-              <a:buSzPct val="70000"/>
-              <a:buFont typeface="Wingdings 2" charset="2"/>
-              <a:buChar char=""/>
-              <a:defRPr sz="1500" kern="1200">
-                <a:ln>
-                  <a:solidFill>
-                    <a:schemeClr val="bg1">
-                      <a:lumMod val="75000"/>
-                      <a:lumOff val="25000"/>
-                      <a:alpha val="10000"/>
-                    </a:schemeClr>
-                  </a:solidFill>
-                </a:ln>
-                <a:solidFill>
-                  <a:schemeClr val="tx2"/>
-                </a:solidFill>
-                <a:effectLst>
-                  <a:outerShdw blurRad="9525" dist="25400" dir="14640000" algn="tl" rotWithShape="0">
-                    <a:schemeClr val="bg1">
-                      <a:alpha val="30000"/>
-                    </a:schemeClr>
-                  </a:outerShdw>
-                </a:effectLst>
-                <a:latin typeface="+mn-lt"/>
-                <a:ea typeface="+mn-ea"/>
-                <a:cs typeface="+mn-cs"/>
-              </a:defRPr>
-            </a:lvl5pPr>
-            <a:lvl6pPr marL="2014600" indent="-228600" algn="l" defTabSz="457200" rtl="0" eaLnBrk="1" latinLnBrk="0" hangingPunct="1">
-              <a:spcBef>
-                <a:spcPct val="20000"/>
-              </a:spcBef>
-              <a:spcAft>
-                <a:spcPts val="600"/>
-              </a:spcAft>
-              <a:buClr>
-                <a:schemeClr val="tx2"/>
-              </a:buClr>
-              <a:buSzPct val="70000"/>
-              <a:buFont typeface="Wingdings 2" charset="2"/>
-              <a:buChar char=""/>
-              <a:defRPr sz="1400" kern="1200">
-                <a:ln>
-                  <a:solidFill>
-                    <a:schemeClr val="bg1">
-                      <a:lumMod val="75000"/>
-                      <a:lumOff val="25000"/>
-                      <a:alpha val="10000"/>
-                    </a:schemeClr>
-                  </a:solidFill>
-                </a:ln>
-                <a:solidFill>
-                  <a:schemeClr val="tx2"/>
-                </a:solidFill>
-                <a:effectLst>
-                  <a:outerShdw blurRad="9525" dist="25400" dir="14640000" algn="tl" rotWithShape="0">
-                    <a:schemeClr val="bg1">
-                      <a:alpha val="30000"/>
-                    </a:schemeClr>
-                  </a:outerShdw>
-                </a:effectLst>
-                <a:latin typeface="+mn-lt"/>
-                <a:ea typeface="+mn-ea"/>
-                <a:cs typeface="+mn-cs"/>
-              </a:defRPr>
-            </a:lvl6pPr>
-            <a:lvl7pPr marL="2401800" indent="-228600" algn="l" defTabSz="457200" rtl="0" eaLnBrk="1" latinLnBrk="0" hangingPunct="1">
-              <a:spcBef>
-                <a:spcPct val="20000"/>
-              </a:spcBef>
-              <a:spcAft>
-                <a:spcPts val="600"/>
-              </a:spcAft>
-              <a:buClr>
-                <a:schemeClr val="tx2"/>
-              </a:buClr>
-              <a:buSzPct val="70000"/>
-              <a:buFont typeface="Wingdings 2" charset="2"/>
-              <a:buChar char=""/>
-              <a:defRPr sz="1400" kern="1200">
-                <a:ln>
-                  <a:solidFill>
-                    <a:schemeClr val="bg1">
-                      <a:lumMod val="75000"/>
-                      <a:lumOff val="25000"/>
-                      <a:alpha val="10000"/>
-                    </a:schemeClr>
-                  </a:solidFill>
-                </a:ln>
-                <a:solidFill>
-                  <a:schemeClr val="tx2"/>
-                </a:solidFill>
-                <a:effectLst>
-                  <a:outerShdw blurRad="9525" dist="25400" dir="14640000" algn="tl" rotWithShape="0">
-                    <a:schemeClr val="bg1">
-                      <a:alpha val="30000"/>
-                    </a:schemeClr>
-                  </a:outerShdw>
-                </a:effectLst>
-                <a:latin typeface="+mn-lt"/>
-                <a:ea typeface="+mn-ea"/>
-                <a:cs typeface="+mn-cs"/>
-              </a:defRPr>
-            </a:lvl7pPr>
-            <a:lvl8pPr marL="2789000" indent="-228600" algn="l" defTabSz="457200" rtl="0" eaLnBrk="1" latinLnBrk="0" hangingPunct="1">
-              <a:spcBef>
-                <a:spcPct val="20000"/>
-              </a:spcBef>
-              <a:spcAft>
-                <a:spcPts val="600"/>
-              </a:spcAft>
-              <a:buClr>
-                <a:schemeClr val="tx2"/>
-              </a:buClr>
-              <a:buSzPct val="70000"/>
-              <a:buFont typeface="Wingdings 2" charset="2"/>
-              <a:buChar char=""/>
-              <a:defRPr sz="1400" kern="1200">
-                <a:ln>
-                  <a:solidFill>
-                    <a:schemeClr val="bg1">
-                      <a:lumMod val="75000"/>
-                      <a:lumOff val="25000"/>
-                      <a:alpha val="10000"/>
-                    </a:schemeClr>
-                  </a:solidFill>
-                </a:ln>
-                <a:solidFill>
-                  <a:schemeClr val="tx2"/>
-                </a:solidFill>
-                <a:effectLst>
-                  <a:outerShdw blurRad="9525" dist="25400" dir="14640000" algn="tl" rotWithShape="0">
-                    <a:schemeClr val="bg1">
-                      <a:alpha val="30000"/>
-                    </a:schemeClr>
-                  </a:outerShdw>
-                </a:effectLst>
-                <a:latin typeface="+mn-lt"/>
-                <a:ea typeface="+mn-ea"/>
-                <a:cs typeface="+mn-cs"/>
-              </a:defRPr>
-            </a:lvl8pPr>
-            <a:lvl9pPr marL="3106200" indent="-228600" algn="l" defTabSz="457200" rtl="0" eaLnBrk="1" latinLnBrk="0" hangingPunct="1">
-              <a:spcBef>
-                <a:spcPct val="20000"/>
-              </a:spcBef>
-              <a:spcAft>
-                <a:spcPts val="600"/>
-              </a:spcAft>
-              <a:buClr>
-                <a:schemeClr val="tx2"/>
-              </a:buClr>
-              <a:buSzPct val="70000"/>
-              <a:buFont typeface="Wingdings 2" charset="2"/>
-              <a:buChar char=""/>
-              <a:defRPr sz="1400" kern="1200">
-                <a:ln>
-                  <a:solidFill>
-                    <a:schemeClr val="bg1">
-                      <a:lumMod val="75000"/>
-                      <a:lumOff val="25000"/>
-                      <a:alpha val="10000"/>
-                    </a:schemeClr>
-                  </a:solidFill>
-                </a:ln>
-                <a:solidFill>
-                  <a:schemeClr val="tx2"/>
-                </a:solidFill>
-                <a:effectLst>
-                  <a:outerShdw blurRad="9525" dist="25400" dir="14640000" algn="tl" rotWithShape="0">
-                    <a:schemeClr val="bg1">
-                      <a:alpha val="30000"/>
-                    </a:schemeClr>
-                  </a:outerShdw>
-                </a:effectLst>
-                <a:latin typeface="+mn-lt"/>
-                <a:ea typeface="+mn-ea"/>
-                <a:cs typeface="+mn-cs"/>
-              </a:defRPr>
-            </a:lvl9pPr>
-          </a:lstStyle>
-          <a:p>
-            <a:r>
-              <a:rPr lang="en-GB" dirty="0"/>
+              <a:rPr lang="en-GB" sz="2400" dirty="0"/>
               <a:t>Followed by non-linear activation function, </a:t>
             </a:r>
             <a:r>
-              <a:rPr lang="en-GB" dirty="0" err="1"/>
+              <a:rPr lang="en-GB" sz="2400" dirty="0" err="1"/>
               <a:t>ReLU</a:t>
             </a:r>
             <a:r>
-              <a:rPr lang="en-GB" dirty="0"/>
+              <a:rPr lang="en-GB" sz="2400" dirty="0"/>
               <a:t> is good</a:t>
             </a:r>
           </a:p>
           <a:p>
             <a:r>
-              <a:rPr lang="en-GB" dirty="0"/>
+              <a:rPr lang="en-GB" sz="2400" dirty="0"/>
               <a:t>Repeat multiple times for deep CNN</a:t>
             </a:r>
           </a:p>
           <a:p>
             <a:r>
-              <a:rPr lang="en-GB" dirty="0"/>
+              <a:rPr lang="en-GB" sz="2400" dirty="0"/>
               <a:t>After Feature Selector comes Decision Net</a:t>
             </a:r>
           </a:p>
           <a:p>
             <a:r>
-              <a:rPr lang="en-GB" dirty="0"/>
+              <a:rPr lang="en-GB" sz="2400" dirty="0"/>
               <a:t>Multi-layer Perceptron with output having only one node in our case</a:t>
             </a:r>
           </a:p>
           <a:p>
             <a:r>
-              <a:rPr lang="en-GB" dirty="0"/>
+              <a:rPr lang="en-GB" sz="2400" dirty="0"/>
               <a:t>Use SoftMax for multiple output nodes or sigmoid if only one output node</a:t>
             </a:r>
           </a:p>
@@ -10456,14 +10320,17 @@
         </p:nvSpPr>
         <p:spPr/>
         <p:txBody>
-          <a:bodyPr/>
+          <a:bodyPr>
+            <a:normAutofit/>
+          </a:bodyPr>
           <a:lstStyle/>
           <a:p>
             <a:r>
-              <a:rPr lang="en-GB"/>
+              <a:rPr lang="en-GB" sz="4000" dirty="0">
+                <a:latin typeface="+mn-lt"/>
+              </a:rPr>
               <a:t>CNN for NLP</a:t>
             </a:r>
-            <a:endParaRPr lang="en-GB" dirty="0"/>
           </a:p>
         </p:txBody>
       </p:sp>
@@ -10486,57 +10353,57 @@
         <p:spPr>
           <a:xfrm>
             <a:off x="924443" y="1697832"/>
-            <a:ext cx="10353762" cy="3131344"/>
+            <a:ext cx="10353762" cy="3462336"/>
           </a:xfrm>
         </p:spPr>
         <p:txBody>
           <a:bodyPr>
-            <a:normAutofit lnSpcReduction="10000"/>
+            <a:normAutofit/>
           </a:bodyPr>
           <a:lstStyle/>
           <a:p>
             <a:r>
-              <a:rPr lang="en-GB" dirty="0"/>
+              <a:rPr lang="en-GB" sz="2400" dirty="0"/>
               <a:t>Need to convert each movie review to a matrix for our model</a:t>
             </a:r>
           </a:p>
           <a:p>
             <a:r>
-              <a:rPr lang="en-GB" dirty="0"/>
+              <a:rPr lang="en-GB" sz="2400" dirty="0"/>
               <a:t>Done by word embedding (</a:t>
             </a:r>
             <a:r>
-              <a:rPr lang="en-GB" dirty="0" err="1"/>
+              <a:rPr lang="en-GB" sz="2400" dirty="0" err="1"/>
               <a:t>GloVe</a:t>
             </a:r>
             <a:r>
-              <a:rPr lang="en-GB" dirty="0"/>
-              <a:t> or Word2Vec) which is a pre-trained matrix on a large text corpus</a:t>
-            </a:r>
-          </a:p>
-          <a:p>
-            <a:r>
-              <a:rPr lang="en-GB" dirty="0"/>
-              <a:t>Puts each word in a vocabulary into a fixed vector space (e.g. 300 dimensional)</a:t>
-            </a:r>
-          </a:p>
-          <a:p>
-            <a:r>
-              <a:rPr lang="en-GB" dirty="0"/>
+              <a:rPr lang="en-GB" sz="2400" dirty="0"/>
+              <a:t> or Word2Vec) </a:t>
+            </a:r>
+          </a:p>
+          <a:p>
+            <a:r>
+              <a:rPr lang="en-GB" sz="2400" dirty="0"/>
+              <a:t>Puts each word in a vocabulary into a fixed vector space (e.g. 300D)</a:t>
+            </a:r>
+          </a:p>
+          <a:p>
+            <a:r>
+              <a:rPr lang="en-GB" sz="2400" dirty="0"/>
               <a:t>Similar words are placed close to each other in the vector space therefore capturing meaning of words</a:t>
             </a:r>
           </a:p>
           <a:p>
             <a:r>
-              <a:rPr lang="en-GB" dirty="0"/>
+              <a:rPr lang="en-GB" sz="2400" dirty="0"/>
               <a:t>Almost the same except perform 1D Convolution and </a:t>
             </a:r>
             <a:r>
-              <a:rPr lang="en-GB" dirty="0" err="1"/>
+              <a:rPr lang="en-GB" sz="2400" dirty="0" err="1"/>
               <a:t>MaxPooling</a:t>
             </a:r>
             <a:r>
-              <a:rPr lang="en-GB" dirty="0"/>
+              <a:rPr lang="en-GB" sz="2400" dirty="0"/>
               <a:t> instead of 2D</a:t>
             </a:r>
           </a:p>
@@ -10577,8 +10444,8 @@
         </p:blipFill>
         <p:spPr bwMode="auto">
           <a:xfrm>
-            <a:off x="3325677" y="4736763"/>
-            <a:ext cx="4849706" cy="1956932"/>
+            <a:off x="3955851" y="4884147"/>
+            <a:ext cx="4280297" cy="1727167"/>
           </a:xfrm>
           <a:prstGeom prst="rect">
             <a:avLst/>
@@ -11036,11 +10903,15 @@
           </a:xfrm>
         </p:spPr>
         <p:txBody>
-          <a:bodyPr/>
+          <a:bodyPr>
+            <a:normAutofit/>
+          </a:bodyPr>
           <a:lstStyle/>
           <a:p>
             <a:r>
-              <a:rPr lang="en-GB" dirty="0"/>
+              <a:rPr lang="en-GB" sz="4000" dirty="0">
+                <a:latin typeface="+mn-lt"/>
+              </a:rPr>
               <a:t>The Final Model</a:t>
             </a:r>
           </a:p>
@@ -11075,69 +10946,63 @@
           <a:lstStyle/>
           <a:p>
             <a:r>
-              <a:rPr lang="en-GB" dirty="0"/>
+              <a:rPr lang="en-GB" sz="2400" dirty="0"/>
               <a:t>Movie Review Polarity Dataset. 1000 positive reviews, 1000 negative reviews</a:t>
             </a:r>
           </a:p>
           <a:p>
             <a:r>
-              <a:rPr lang="en-GB" dirty="0"/>
+              <a:rPr lang="en-GB" sz="2400" dirty="0"/>
               <a:t>300D </a:t>
             </a:r>
             <a:r>
-              <a:rPr lang="en-GB" dirty="0" err="1"/>
+              <a:rPr lang="en-GB" sz="2400" dirty="0" err="1"/>
               <a:t>GloVe</a:t>
             </a:r>
             <a:r>
-              <a:rPr lang="en-GB" dirty="0"/>
+              <a:rPr lang="en-GB" sz="2400" dirty="0"/>
               <a:t> Word Embedding trained on 6B words</a:t>
             </a:r>
           </a:p>
           <a:p>
             <a:r>
-              <a:rPr lang="en-GB" dirty="0"/>
-              <a:t>Movie reviews padded to third percentile length, e.g. if third percentile is 700 words, input matrix will have dimensionality 700x300 </a:t>
-            </a:r>
-          </a:p>
-          <a:p>
-            <a:r>
-              <a:rPr lang="en-GB" dirty="0"/>
+              <a:rPr lang="en-GB" sz="2400" dirty="0"/>
               <a:t>3 Channels each with their own trainable word embedding seeded with </a:t>
             </a:r>
             <a:r>
-              <a:rPr lang="en-GB" dirty="0" err="1"/>
+              <a:rPr lang="en-GB" sz="2400" dirty="0" err="1"/>
               <a:t>GloVe</a:t>
             </a:r>
-            <a:endParaRPr lang="en-GB" dirty="0"/>
-          </a:p>
-          <a:p>
-            <a:r>
-              <a:rPr lang="en-GB" dirty="0"/>
-              <a:t>Channels each have 32 filters with kernel size 5, 6, 7 respectively</a:t>
-            </a:r>
-          </a:p>
-          <a:p>
-            <a:r>
-              <a:rPr lang="en-GB" dirty="0"/>
-              <a:t>Followed by Dropout with 50% chance, </a:t>
-            </a:r>
-            <a:r>
-              <a:rPr lang="en-GB" dirty="0" err="1"/>
+            <a:endParaRPr lang="en-GB" sz="2400" dirty="0"/>
+          </a:p>
+          <a:p>
+            <a:r>
+              <a:rPr lang="en-GB" sz="2400" dirty="0"/>
+              <a:t>Channels each have 32 filters with kernel size 4, 6, 8 respectively</a:t>
+            </a:r>
+          </a:p>
+          <a:p>
+            <a:r>
+              <a:rPr lang="en-GB" sz="2400" dirty="0"/>
+              <a:t>Followed by Dropout, </a:t>
+            </a:r>
+            <a:r>
+              <a:rPr lang="en-GB" sz="2400" dirty="0" err="1"/>
               <a:t>MaxPooling</a:t>
             </a:r>
             <a:r>
-              <a:rPr lang="en-GB" dirty="0"/>
+              <a:rPr lang="en-GB" sz="2400" dirty="0"/>
               <a:t> and </a:t>
             </a:r>
             <a:r>
-              <a:rPr lang="en-GB" dirty="0" err="1"/>
+              <a:rPr lang="en-GB" sz="2400" dirty="0" err="1"/>
               <a:t>ReLU</a:t>
             </a:r>
-            <a:endParaRPr lang="en-GB" dirty="0"/>
-          </a:p>
-          <a:p>
-            <a:r>
-              <a:rPr lang="en-GB" dirty="0"/>
+            <a:endParaRPr lang="en-GB" sz="2400" dirty="0"/>
+          </a:p>
+          <a:p>
+            <a:r>
+              <a:rPr lang="en-GB" sz="2400" dirty="0"/>
               <a:t>96 Response maps flattened and concatenated to form 20096 -&gt; 10 -&gt; 1 MLP</a:t>
             </a:r>
           </a:p>
@@ -11539,67 +11404,6 @@
                       </p:childTnLst>
                     </p:cTn>
                   </p:par>
-                  <p:par>
-                    <p:cTn id="33" fill="hold">
-                      <p:stCondLst>
-                        <p:cond delay="indefinite"/>
-                      </p:stCondLst>
-                      <p:childTnLst>
-                        <p:par>
-                          <p:cTn id="34" fill="hold">
-                            <p:stCondLst>
-                              <p:cond delay="0"/>
-                            </p:stCondLst>
-                            <p:childTnLst>
-                              <p:par>
-                                <p:cTn id="35" presetID="10" presetClass="entr" presetSubtype="0" fill="hold" nodeType="clickEffect">
-                                  <p:stCondLst>
-                                    <p:cond delay="0"/>
-                                  </p:stCondLst>
-                                  <p:childTnLst>
-                                    <p:set>
-                                      <p:cBhvr>
-                                        <p:cTn id="36" dur="1" fill="hold">
-                                          <p:stCondLst>
-                                            <p:cond delay="0"/>
-                                          </p:stCondLst>
-                                        </p:cTn>
-                                        <p:tgtEl>
-                                          <p:spTgt spid="3">
-                                            <p:txEl>
-                                              <p:pRg st="6" end="6"/>
-                                            </p:txEl>
-                                          </p:spTgt>
-                                        </p:tgtEl>
-                                        <p:attrNameLst>
-                                          <p:attrName>style.visibility</p:attrName>
-                                        </p:attrNameLst>
-                                      </p:cBhvr>
-                                      <p:to>
-                                        <p:strVal val="visible"/>
-                                      </p:to>
-                                    </p:set>
-                                    <p:animEffect transition="in" filter="fade">
-                                      <p:cBhvr>
-                                        <p:cTn id="37" dur="500"/>
-                                        <p:tgtEl>
-                                          <p:spTgt spid="3">
-                                            <p:txEl>
-                                              <p:pRg st="6" end="6"/>
-                                            </p:txEl>
-                                          </p:spTgt>
-                                        </p:tgtEl>
-                                      </p:cBhvr>
-                                    </p:animEffect>
-                                  </p:childTnLst>
-                                </p:cTn>
-                              </p:par>
-                            </p:childTnLst>
-                          </p:cTn>
-                        </p:par>
-                      </p:childTnLst>
-                    </p:cTn>
-                  </p:par>
                 </p:childTnLst>
               </p:cTn>
               <p:prevCondLst>
@@ -11660,11 +11464,15 @@
         </p:nvSpPr>
         <p:spPr/>
         <p:txBody>
-          <a:bodyPr/>
+          <a:bodyPr>
+            <a:normAutofit/>
+          </a:bodyPr>
           <a:lstStyle/>
           <a:p>
             <a:r>
-              <a:rPr lang="en-GB" dirty="0"/>
+              <a:rPr lang="en-GB" sz="4000" dirty="0">
+                <a:latin typeface="+mn-lt"/>
+              </a:rPr>
               <a:t>The Final Model</a:t>
             </a:r>
           </a:p>
@@ -11688,78 +11496,76 @@
         </p:nvSpPr>
         <p:spPr/>
         <p:txBody>
-          <a:bodyPr/>
+          <a:bodyPr>
+            <a:normAutofit/>
+          </a:bodyPr>
           <a:lstStyle/>
           <a:p>
             <a:r>
-              <a:rPr lang="en-GB" dirty="0"/>
+              <a:rPr lang="en-GB" sz="2500" dirty="0"/>
               <a:t>Binary cross entropy used as cost function and </a:t>
             </a:r>
             <a:r>
-              <a:rPr lang="en-GB" dirty="0" err="1"/>
+              <a:rPr lang="en-GB" sz="2500" dirty="0" err="1"/>
               <a:t>adam</a:t>
             </a:r>
             <a:r>
-              <a:rPr lang="en-GB" dirty="0"/>
+              <a:rPr lang="en-GB" sz="2500" dirty="0"/>
               <a:t> optimizer</a:t>
             </a:r>
           </a:p>
           <a:p>
             <a:r>
-              <a:rPr lang="en-GB"/>
-              <a:t>24,799,877 </a:t>
-            </a:r>
-            <a:r>
-              <a:rPr lang="en-GB" dirty="0"/>
-              <a:t>trainable parameters</a:t>
-            </a:r>
-          </a:p>
-          <a:p>
-            <a:r>
-              <a:rPr lang="en-GB" dirty="0"/>
+              <a:rPr lang="en-GB" sz="2500" dirty="0"/>
+              <a:t>24,799,577 trainable parameters</a:t>
+            </a:r>
+          </a:p>
+          <a:p>
+            <a:r>
+              <a:rPr lang="en-GB" sz="2500" dirty="0"/>
               <a:t>Training Accuracy: 100%</a:t>
             </a:r>
           </a:p>
           <a:p>
             <a:r>
-              <a:rPr lang="en-GB" dirty="0"/>
+              <a:rPr lang="en-GB" sz="2500" dirty="0"/>
               <a:t>Test Set Accuracy: 85%</a:t>
             </a:r>
           </a:p>
           <a:p>
             <a:r>
-              <a:rPr lang="en-GB" dirty="0"/>
+              <a:rPr lang="en-GB" sz="2500" dirty="0"/>
               <a:t>Trained using </a:t>
             </a:r>
             <a:r>
-              <a:rPr lang="en-GB" dirty="0" err="1"/>
+              <a:rPr lang="en-GB" sz="2500" dirty="0" err="1"/>
               <a:t>Keras</a:t>
             </a:r>
             <a:r>
-              <a:rPr lang="en-GB" dirty="0"/>
+              <a:rPr lang="en-GB" sz="2500" dirty="0"/>
               <a:t>, TensorFlow backend</a:t>
             </a:r>
           </a:p>
           <a:p>
             <a:r>
-              <a:rPr lang="en-GB" dirty="0"/>
+              <a:rPr lang="en-GB" sz="2500" dirty="0"/>
               <a:t>Code available on my </a:t>
             </a:r>
             <a:r>
-              <a:rPr lang="en-GB" dirty="0" err="1"/>
+              <a:rPr lang="en-GB" sz="2500" dirty="0" err="1"/>
               <a:t>github</a:t>
             </a:r>
             <a:r>
-              <a:rPr lang="en-GB" dirty="0"/>
+              <a:rPr lang="en-GB" sz="2500" dirty="0"/>
               <a:t>:  </a:t>
             </a:r>
             <a:r>
-              <a:rPr lang="en-GB" dirty="0">
+              <a:rPr lang="en-GB" sz="2500" dirty="0">
                 <a:hlinkClick r:id="rId2"/>
               </a:rPr>
               <a:t>https://github.com/psyfb2</a:t>
             </a:r>
-            <a:endParaRPr lang="en-GB" dirty="0"/>
+            <a:endParaRPr lang="en-GB" sz="2500" dirty="0"/>
           </a:p>
         </p:txBody>
       </p:sp>
@@ -12207,11 +12013,15 @@
         </p:nvSpPr>
         <p:spPr/>
         <p:txBody>
-          <a:bodyPr/>
+          <a:bodyPr>
+            <a:normAutofit/>
+          </a:bodyPr>
           <a:lstStyle/>
           <a:p>
             <a:r>
-              <a:rPr lang="en-GB" dirty="0"/>
+              <a:rPr lang="en-GB" sz="4000" dirty="0">
+                <a:latin typeface="+mn-lt"/>
+              </a:rPr>
               <a:t>Improvements</a:t>
             </a:r>
           </a:p>
@@ -12240,58 +12050,60 @@
           </a:xfrm>
         </p:spPr>
         <p:txBody>
-          <a:bodyPr/>
+          <a:bodyPr>
+            <a:normAutofit/>
+          </a:bodyPr>
           <a:lstStyle/>
           <a:p>
             <a:r>
-              <a:rPr lang="en-GB" dirty="0"/>
+              <a:rPr lang="en-GB" sz="2400" dirty="0"/>
               <a:t>Instead of </a:t>
             </a:r>
             <a:r>
-              <a:rPr lang="en-GB" dirty="0" err="1"/>
+              <a:rPr lang="en-GB" sz="2400" dirty="0" err="1"/>
               <a:t>GloVe</a:t>
             </a:r>
             <a:r>
-              <a:rPr lang="en-GB" dirty="0"/>
+              <a:rPr lang="en-GB" sz="2400" dirty="0"/>
               <a:t> or Word2Vec use BERT</a:t>
             </a:r>
           </a:p>
           <a:p>
             <a:r>
-              <a:rPr lang="en-GB" dirty="0"/>
+              <a:rPr lang="en-GB" sz="2400" dirty="0"/>
               <a:t>Tune hyper-parameters using grid search</a:t>
             </a:r>
           </a:p>
           <a:p>
             <a:r>
-              <a:rPr lang="en-GB" dirty="0"/>
+              <a:rPr lang="en-GB" sz="2400" dirty="0"/>
               <a:t>K-Fold Cross Validation for more reliable accuracy measurement</a:t>
             </a:r>
           </a:p>
           <a:p>
             <a:r>
-              <a:rPr lang="en-GB" dirty="0"/>
+              <a:rPr lang="en-GB" sz="2400" dirty="0"/>
               <a:t>Character level Deep CNN has been shown to outperform word level CNN</a:t>
             </a:r>
           </a:p>
           <a:p>
-            <a:endParaRPr lang="en-GB" dirty="0"/>
-          </a:p>
-          <a:p>
-            <a:endParaRPr lang="en-GB" dirty="0"/>
-          </a:p>
-          <a:p>
-            <a:endParaRPr lang="en-GB" dirty="0"/>
-          </a:p>
-          <a:p>
-            <a:r>
-              <a:rPr lang="en-GB" dirty="0"/>
-              <a:t>Next project is a non-goal oriented Q&amp;A chatbot using deep Sequence to Sequence LSTM</a:t>
-            </a:r>
-          </a:p>
-          <a:p>
-            <a:r>
-              <a:rPr lang="en-GB" dirty="0"/>
+            <a:endParaRPr lang="en-GB" sz="2400" dirty="0"/>
+          </a:p>
+          <a:p>
+            <a:pPr marL="36900" indent="0">
+              <a:buNone/>
+            </a:pPr>
+            <a:endParaRPr lang="en-GB" sz="2400" dirty="0"/>
+          </a:p>
+          <a:p>
+            <a:r>
+              <a:rPr lang="en-GB" sz="2400" dirty="0"/>
+              <a:t>Next project is a Q&amp;A chatbot using deep Sequence to Sequence LSTM</a:t>
+            </a:r>
+          </a:p>
+          <a:p>
+            <a:r>
+              <a:rPr lang="en-GB" sz="2400" dirty="0"/>
               <a:t>Thanks for Listening!</a:t>
             </a:r>
           </a:p>
@@ -12599,7 +12411,7 @@
                                         <p:tgtEl>
                                           <p:spTgt spid="3">
                                             <p:txEl>
-                                              <p:pRg st="7" end="7"/>
+                                              <p:pRg st="6" end="6"/>
                                             </p:txEl>
                                           </p:spTgt>
                                         </p:tgtEl>
@@ -12617,7 +12429,7 @@
                                         <p:tgtEl>
                                           <p:spTgt spid="3">
                                             <p:txEl>
-                                              <p:pRg st="7" end="7"/>
+                                              <p:pRg st="6" end="6"/>
                                             </p:txEl>
                                           </p:spTgt>
                                         </p:tgtEl>
@@ -12660,7 +12472,7 @@
                                         <p:tgtEl>
                                           <p:spTgt spid="3">
                                             <p:txEl>
-                                              <p:pRg st="8" end="8"/>
+                                              <p:pRg st="7" end="7"/>
                                             </p:txEl>
                                           </p:spTgt>
                                         </p:tgtEl>
@@ -12678,7 +12490,7 @@
                                         <p:tgtEl>
                                           <p:spTgt spid="3">
                                             <p:txEl>
-                                              <p:pRg st="8" end="8"/>
+                                              <p:pRg st="7" end="7"/>
                                             </p:txEl>
                                           </p:spTgt>
                                         </p:tgtEl>

</xml_diff>